<commit_message>
update layout and text in poster
</commit_message>
<xml_diff>
--- a/poster/poster_template.pptx
+++ b/poster/poster_template.pptx
@@ -106,7 +106,7 @@
   </p:defaultTextStyle>
   <p:extLst>
     <p:ext uri="{EFAFB233-063F-42B5-8137-9DF3F51BA10A}">
-      <p15:sldGuideLst xmlns:p15="http://schemas.microsoft.com/office/powerpoint/2012/main">
+      <p15:sldGuideLst xmlns:p15="http://schemas.microsoft.com/office/powerpoint/2012/main" xmlns="">
         <p15:guide id="1" orient="horz" pos="9536" userDrawn="1">
           <p15:clr>
             <a:srgbClr val="A4A3A4"/>
@@ -312,7 +312,7 @@
           <a:p>
             <a:fld id="{0B7A2DEA-69B7-D343-870B-04A176525892}" type="datetimeFigureOut">
               <a:rPr lang="de-DE" smtClean="0"/>
-              <a:t>16.01.18</a:t>
+              <a:t>18.01.2018</a:t>
             </a:fld>
             <a:endParaRPr lang="en-US"/>
           </a:p>
@@ -482,7 +482,7 @@
           <a:p>
             <a:fld id="{0B7A2DEA-69B7-D343-870B-04A176525892}" type="datetimeFigureOut">
               <a:rPr lang="de-DE" smtClean="0"/>
-              <a:t>16.01.18</a:t>
+              <a:t>18.01.2018</a:t>
             </a:fld>
             <a:endParaRPr lang="en-US"/>
           </a:p>
@@ -662,7 +662,7 @@
           <a:p>
             <a:fld id="{0B7A2DEA-69B7-D343-870B-04A176525892}" type="datetimeFigureOut">
               <a:rPr lang="de-DE" smtClean="0"/>
-              <a:t>16.01.18</a:t>
+              <a:t>18.01.2018</a:t>
             </a:fld>
             <a:endParaRPr lang="en-US"/>
           </a:p>
@@ -832,7 +832,7 @@
           <a:p>
             <a:fld id="{0B7A2DEA-69B7-D343-870B-04A176525892}" type="datetimeFigureOut">
               <a:rPr lang="de-DE" smtClean="0"/>
-              <a:t>16.01.18</a:t>
+              <a:t>18.01.2018</a:t>
             </a:fld>
             <a:endParaRPr lang="en-US"/>
           </a:p>
@@ -1078,7 +1078,7 @@
           <a:p>
             <a:fld id="{0B7A2DEA-69B7-D343-870B-04A176525892}" type="datetimeFigureOut">
               <a:rPr lang="de-DE" smtClean="0"/>
-              <a:t>16.01.18</a:t>
+              <a:t>18.01.2018</a:t>
             </a:fld>
             <a:endParaRPr lang="en-US"/>
           </a:p>
@@ -1366,7 +1366,7 @@
           <a:p>
             <a:fld id="{0B7A2DEA-69B7-D343-870B-04A176525892}" type="datetimeFigureOut">
               <a:rPr lang="de-DE" smtClean="0"/>
-              <a:t>16.01.18</a:t>
+              <a:t>18.01.2018</a:t>
             </a:fld>
             <a:endParaRPr lang="en-US"/>
           </a:p>
@@ -1793,7 +1793,7 @@
           <a:p>
             <a:fld id="{0B7A2DEA-69B7-D343-870B-04A176525892}" type="datetimeFigureOut">
               <a:rPr lang="de-DE" smtClean="0"/>
-              <a:t>16.01.18</a:t>
+              <a:t>18.01.2018</a:t>
             </a:fld>
             <a:endParaRPr lang="en-US"/>
           </a:p>
@@ -1911,7 +1911,7 @@
           <a:p>
             <a:fld id="{0B7A2DEA-69B7-D343-870B-04A176525892}" type="datetimeFigureOut">
               <a:rPr lang="de-DE" smtClean="0"/>
-              <a:t>16.01.18</a:t>
+              <a:t>18.01.2018</a:t>
             </a:fld>
             <a:endParaRPr lang="en-US"/>
           </a:p>
@@ -2006,7 +2006,7 @@
           <a:p>
             <a:fld id="{0B7A2DEA-69B7-D343-870B-04A176525892}" type="datetimeFigureOut">
               <a:rPr lang="de-DE" smtClean="0"/>
-              <a:t>16.01.18</a:t>
+              <a:t>18.01.2018</a:t>
             </a:fld>
             <a:endParaRPr lang="en-US"/>
           </a:p>
@@ -2283,7 +2283,7 @@
           <a:p>
             <a:fld id="{0B7A2DEA-69B7-D343-870B-04A176525892}" type="datetimeFigureOut">
               <a:rPr lang="de-DE" smtClean="0"/>
-              <a:t>16.01.18</a:t>
+              <a:t>18.01.2018</a:t>
             </a:fld>
             <a:endParaRPr lang="en-US"/>
           </a:p>
@@ -2536,7 +2536,7 @@
           <a:p>
             <a:fld id="{0B7A2DEA-69B7-D343-870B-04A176525892}" type="datetimeFigureOut">
               <a:rPr lang="de-DE" smtClean="0"/>
-              <a:t>16.01.18</a:t>
+              <a:t>18.01.2018</a:t>
             </a:fld>
             <a:endParaRPr lang="en-US"/>
           </a:p>
@@ -2749,7 +2749,7 @@
           <a:p>
             <a:fld id="{0B7A2DEA-69B7-D343-870B-04A176525892}" type="datetimeFigureOut">
               <a:rPr lang="de-DE" smtClean="0"/>
-              <a:t>16.01.18</a:t>
+              <a:t>18.01.2018</a:t>
             </a:fld>
             <a:endParaRPr lang="en-US"/>
           </a:p>
@@ -3137,7 +3137,7 @@
       </p:grpSpPr>
       <p:sp>
         <p:nvSpPr>
-          <p:cNvPr id="69" name="Rectangle 163"/>
+          <p:cNvPr id="103" name="Rectangle 163"/>
           <p:cNvSpPr>
             <a:spLocks noChangeArrowheads="1"/>
           </p:cNvSpPr>
@@ -3145,8 +3145,8 @@
         </p:nvSpPr>
         <p:spPr bwMode="auto">
           <a:xfrm>
-            <a:off x="10925400" y="24146420"/>
-            <a:ext cx="20659934" cy="646923"/>
+            <a:off x="32178494" y="5850139"/>
+            <a:ext cx="9344944" cy="827153"/>
           </a:xfrm>
           <a:prstGeom prst="rect">
             <a:avLst/>
@@ -3192,6 +3192,174 @@
               </a:solidFill>
               <a:latin typeface="Arial" panose="020B0604020202020204" pitchFamily="34" charset="0"/>
               <a:cs typeface="Arial" panose="020B0604020202020204" pitchFamily="34" charset="0"/>
+            </a:endParaRPr>
+          </a:p>
+        </p:txBody>
+      </p:sp>
+      <p:sp>
+        <p:nvSpPr>
+          <p:cNvPr id="101" name="Rectangle 163"/>
+          <p:cNvSpPr>
+            <a:spLocks noChangeArrowheads="1"/>
+          </p:cNvSpPr>
+          <p:nvPr/>
+        </p:nvSpPr>
+        <p:spPr bwMode="auto">
+          <a:xfrm>
+            <a:off x="21876104" y="5850139"/>
+            <a:ext cx="9344944" cy="827153"/>
+          </a:xfrm>
+          <a:prstGeom prst="rect">
+            <a:avLst/>
+          </a:prstGeom>
+          <a:gradFill>
+            <a:gsLst>
+              <a:gs pos="0">
+                <a:schemeClr val="tx2">
+                  <a:lumMod val="50000"/>
+                </a:schemeClr>
+              </a:gs>
+              <a:gs pos="50000">
+                <a:schemeClr val="tx2">
+                  <a:lumMod val="75000"/>
+                </a:schemeClr>
+              </a:gs>
+              <a:gs pos="100000">
+                <a:schemeClr val="tx2">
+                  <a:lumMod val="50000"/>
+                </a:schemeClr>
+              </a:gs>
+            </a:gsLst>
+            <a:lin ang="5400000" scaled="1"/>
+          </a:gradFill>
+          <a:ln w="9525">
+            <a:solidFill>
+              <a:schemeClr val="tx1"/>
+            </a:solidFill>
+            <a:miter lim="800000"/>
+            <a:headEnd/>
+            <a:tailEnd/>
+          </a:ln>
+          <a:effectLst/>
+        </p:spPr>
+        <p:txBody>
+          <a:bodyPr wrap="none" lIns="96996" tIns="48498" rIns="96996" bIns="48498" anchor="ctr"/>
+          <a:lstStyle/>
+          <a:p>
+            <a:pPr algn="just" defTabSz="2660888"/>
+            <a:endParaRPr lang="en-US" sz="1273" dirty="0">
+              <a:solidFill>
+                <a:schemeClr val="accent1"/>
+              </a:solidFill>
+              <a:latin typeface="Arial" panose="020B0604020202020204" pitchFamily="34" charset="0"/>
+              <a:cs typeface="Arial" panose="020B0604020202020204" pitchFamily="34" charset="0"/>
+            </a:endParaRPr>
+          </a:p>
+        </p:txBody>
+      </p:sp>
+      <p:sp>
+        <p:nvSpPr>
+          <p:cNvPr id="99" name="Rectangle 163"/>
+          <p:cNvSpPr>
+            <a:spLocks noChangeArrowheads="1"/>
+          </p:cNvSpPr>
+          <p:nvPr/>
+        </p:nvSpPr>
+        <p:spPr bwMode="auto">
+          <a:xfrm>
+            <a:off x="11532519" y="5850139"/>
+            <a:ext cx="9344944" cy="827153"/>
+          </a:xfrm>
+          <a:prstGeom prst="rect">
+            <a:avLst/>
+          </a:prstGeom>
+          <a:gradFill>
+            <a:gsLst>
+              <a:gs pos="0">
+                <a:schemeClr val="tx2">
+                  <a:lumMod val="50000"/>
+                </a:schemeClr>
+              </a:gs>
+              <a:gs pos="50000">
+                <a:schemeClr val="tx2">
+                  <a:lumMod val="75000"/>
+                </a:schemeClr>
+              </a:gs>
+              <a:gs pos="100000">
+                <a:schemeClr val="tx2">
+                  <a:lumMod val="50000"/>
+                </a:schemeClr>
+              </a:gs>
+            </a:gsLst>
+            <a:lin ang="5400000" scaled="1"/>
+          </a:gradFill>
+          <a:ln w="9525">
+            <a:solidFill>
+              <a:schemeClr val="tx1"/>
+            </a:solidFill>
+            <a:miter lim="800000"/>
+            <a:headEnd/>
+            <a:tailEnd/>
+          </a:ln>
+          <a:effectLst/>
+        </p:spPr>
+        <p:txBody>
+          <a:bodyPr wrap="none" lIns="96996" tIns="48498" rIns="96996" bIns="48498" anchor="ctr"/>
+          <a:lstStyle/>
+          <a:p>
+            <a:pPr algn="just" defTabSz="2660888"/>
+            <a:endParaRPr lang="en-US" sz="1273" dirty="0">
+              <a:solidFill>
+                <a:schemeClr val="accent1"/>
+              </a:solidFill>
+              <a:latin typeface="Arial" panose="020B0604020202020204" pitchFamily="34" charset="0"/>
+              <a:cs typeface="Arial" panose="020B0604020202020204" pitchFamily="34" charset="0"/>
+            </a:endParaRPr>
+          </a:p>
+        </p:txBody>
+      </p:sp>
+      <p:sp>
+        <p:nvSpPr>
+          <p:cNvPr id="28" name="Textfeld 27"/>
+          <p:cNvSpPr txBox="1"/>
+          <p:nvPr/>
+        </p:nvSpPr>
+        <p:spPr>
+          <a:xfrm>
+            <a:off x="21359454" y="5815536"/>
+            <a:ext cx="10704740" cy="4099989"/>
+          </a:xfrm>
+          <a:prstGeom prst="rect">
+            <a:avLst/>
+          </a:prstGeom>
+          <a:noFill/>
+          <a:effectLst/>
+        </p:spPr>
+        <p:txBody>
+          <a:bodyPr wrap="square" rtlCol="0">
+            <a:noAutofit/>
+          </a:bodyPr>
+          <a:lstStyle/>
+          <a:p>
+            <a:pPr marL="404185" indent="-269457" algn="just">
+              <a:buFont typeface="Arial" charset="0"/>
+              <a:buChar char="•"/>
+            </a:pPr>
+            <a:endParaRPr lang="de-DE" sz="2122" dirty="0">
+              <a:latin typeface="Times New Roman" charset="0"/>
+              <a:ea typeface="Times New Roman" charset="0"/>
+              <a:cs typeface="Times New Roman" charset="0"/>
+            </a:endParaRPr>
+          </a:p>
+          <a:p>
+            <a:pPr marL="404185" indent="-269457" algn="just">
+              <a:buFont typeface="Arial" charset="0"/>
+              <a:buChar char="•"/>
+            </a:pPr>
+            <a:endParaRPr lang="de-DE" sz="2122" dirty="0">
+              <a:latin typeface="Times New Roman" charset="0"/>
+              <a:ea typeface="Times New Roman" charset="0"/>
+              <a:cs typeface="Times New Roman" charset="0"/>
             </a:endParaRPr>
           </a:p>
         </p:txBody>
@@ -3406,7 +3574,54 @@
       </p:sp>
       <p:sp>
         <p:nvSpPr>
-          <p:cNvPr id="74" name="Rectangle 163"/>
+          <p:cNvPr id="68" name="Textfeld 67"/>
+          <p:cNvSpPr txBox="1"/>
+          <p:nvPr/>
+        </p:nvSpPr>
+        <p:spPr>
+          <a:xfrm>
+            <a:off x="11060141" y="11966430"/>
+            <a:ext cx="9309312" cy="636649"/>
+          </a:xfrm>
+          <a:prstGeom prst="rect">
+            <a:avLst/>
+          </a:prstGeom>
+          <a:noFill/>
+          <a:ln w="12700" cmpd="sng">
+            <a:noFill/>
+          </a:ln>
+          <a:effectLst/>
+        </p:spPr>
+        <p:txBody>
+          <a:bodyPr wrap="square" rtlCol="0">
+            <a:spAutoFit/>
+          </a:bodyPr>
+          <a:lstStyle/>
+          <a:p>
+            <a:pPr algn="just"/>
+            <a:r>
+              <a:rPr lang="en-US" sz="3537" b="1" dirty="0">
+                <a:solidFill>
+                  <a:srgbClr val="DCE6F2"/>
+                </a:solidFill>
+                <a:latin typeface="Arial" panose="020B0604020202020204" pitchFamily="34" charset="0"/>
+                <a:cs typeface="Arial" panose="020B0604020202020204" pitchFamily="34" charset="0"/>
+              </a:rPr>
+              <a:t>3. Results</a:t>
+            </a:r>
+            <a:endParaRPr lang="en-US" sz="2829" dirty="0">
+              <a:solidFill>
+                <a:srgbClr val="000000"/>
+              </a:solidFill>
+              <a:latin typeface="Arial" panose="020B0604020202020204" pitchFamily="34" charset="0"/>
+              <a:cs typeface="Arial" panose="020B0604020202020204" pitchFamily="34" charset="0"/>
+            </a:endParaRPr>
+          </a:p>
+        </p:txBody>
+      </p:sp>
+      <p:sp>
+        <p:nvSpPr>
+          <p:cNvPr id="71" name="Rectangle 163"/>
           <p:cNvSpPr>
             <a:spLocks noChangeArrowheads="1"/>
           </p:cNvSpPr>
@@ -3414,8 +3629,8 @@
         </p:nvSpPr>
         <p:spPr bwMode="auto">
           <a:xfrm>
-            <a:off x="10420" y="11843015"/>
-            <a:ext cx="42801279" cy="1007111"/>
+            <a:off x="1233714" y="5850139"/>
+            <a:ext cx="9344944" cy="827153"/>
           </a:xfrm>
           <a:prstGeom prst="rect">
             <a:avLst/>
@@ -3467,233 +3682,6 @@
       </p:sp>
       <p:sp>
         <p:nvSpPr>
-          <p:cNvPr id="68" name="Textfeld 67"/>
-          <p:cNvSpPr txBox="1"/>
-          <p:nvPr/>
-        </p:nvSpPr>
-        <p:spPr>
-          <a:xfrm>
-            <a:off x="11060141" y="11966430"/>
-            <a:ext cx="9309312" cy="636649"/>
-          </a:xfrm>
-          <a:prstGeom prst="rect">
-            <a:avLst/>
-          </a:prstGeom>
-          <a:noFill/>
-          <a:ln w="12700" cmpd="sng">
-            <a:noFill/>
-          </a:ln>
-          <a:effectLst/>
-        </p:spPr>
-        <p:txBody>
-          <a:bodyPr wrap="square" rtlCol="0">
-            <a:spAutoFit/>
-          </a:bodyPr>
-          <a:lstStyle/>
-          <a:p>
-            <a:pPr algn="just"/>
-            <a:r>
-              <a:rPr lang="en-US" sz="3537" b="1" dirty="0">
-                <a:solidFill>
-                  <a:srgbClr val="DCE6F2"/>
-                </a:solidFill>
-                <a:latin typeface="Arial" panose="020B0604020202020204" pitchFamily="34" charset="0"/>
-                <a:cs typeface="Arial" panose="020B0604020202020204" pitchFamily="34" charset="0"/>
-              </a:rPr>
-              <a:t>3. </a:t>
-            </a:r>
-            <a:r>
-              <a:rPr lang="en-US" sz="3537" b="1" dirty="0">
-                <a:solidFill>
-                  <a:srgbClr val="DCE6F2"/>
-                </a:solidFill>
-                <a:latin typeface="Arial" panose="020B0604020202020204" pitchFamily="34" charset="0"/>
-                <a:cs typeface="Arial" panose="020B0604020202020204" pitchFamily="34" charset="0"/>
-              </a:rPr>
-              <a:t>Results</a:t>
-            </a:r>
-            <a:endParaRPr lang="en-US" sz="2829" dirty="0">
-              <a:solidFill>
-                <a:srgbClr val="000000"/>
-              </a:solidFill>
-              <a:latin typeface="Arial" panose="020B0604020202020204" pitchFamily="34" charset="0"/>
-              <a:cs typeface="Arial" panose="020B0604020202020204" pitchFamily="34" charset="0"/>
-            </a:endParaRPr>
-          </a:p>
-        </p:txBody>
-      </p:sp>
-      <p:sp>
-        <p:nvSpPr>
-          <p:cNvPr id="71" name="Rectangle 163"/>
-          <p:cNvSpPr>
-            <a:spLocks noChangeArrowheads="1"/>
-          </p:cNvSpPr>
-          <p:nvPr/>
-        </p:nvSpPr>
-        <p:spPr bwMode="auto">
-          <a:xfrm>
-            <a:off x="0" y="5850139"/>
-            <a:ext cx="21157313" cy="827153"/>
-          </a:xfrm>
-          <a:prstGeom prst="rect">
-            <a:avLst/>
-          </a:prstGeom>
-          <a:gradFill>
-            <a:gsLst>
-              <a:gs pos="0">
-                <a:schemeClr val="tx2">
-                  <a:lumMod val="50000"/>
-                </a:schemeClr>
-              </a:gs>
-              <a:gs pos="50000">
-                <a:schemeClr val="tx2">
-                  <a:lumMod val="75000"/>
-                </a:schemeClr>
-              </a:gs>
-              <a:gs pos="100000">
-                <a:schemeClr val="tx2">
-                  <a:lumMod val="50000"/>
-                </a:schemeClr>
-              </a:gs>
-            </a:gsLst>
-            <a:lin ang="5400000" scaled="1"/>
-          </a:gradFill>
-          <a:ln w="9525">
-            <a:solidFill>
-              <a:schemeClr val="tx1"/>
-            </a:solidFill>
-            <a:miter lim="800000"/>
-            <a:headEnd/>
-            <a:tailEnd/>
-          </a:ln>
-          <a:effectLst/>
-        </p:spPr>
-        <p:txBody>
-          <a:bodyPr wrap="none" lIns="96996" tIns="48498" rIns="96996" bIns="48498" anchor="ctr"/>
-          <a:lstStyle/>
-          <a:p>
-            <a:pPr algn="just" defTabSz="2660888"/>
-            <a:endParaRPr lang="en-US" sz="1273" dirty="0">
-              <a:solidFill>
-                <a:schemeClr val="accent1"/>
-              </a:solidFill>
-              <a:latin typeface="Arial" panose="020B0604020202020204" pitchFamily="34" charset="0"/>
-              <a:cs typeface="Arial" panose="020B0604020202020204" pitchFamily="34" charset="0"/>
-            </a:endParaRPr>
-          </a:p>
-        </p:txBody>
-      </p:sp>
-      <p:sp>
-        <p:nvSpPr>
-          <p:cNvPr id="75" name="Textfeld 74"/>
-          <p:cNvSpPr txBox="1"/>
-          <p:nvPr/>
-        </p:nvSpPr>
-        <p:spPr>
-          <a:xfrm>
-            <a:off x="11120021" y="29275423"/>
-            <a:ext cx="20465314" cy="244682"/>
-          </a:xfrm>
-          <a:prstGeom prst="rect">
-            <a:avLst/>
-          </a:prstGeom>
-          <a:noFill/>
-          <a:effectLst/>
-        </p:spPr>
-        <p:txBody>
-          <a:bodyPr wrap="square" rtlCol="0">
-            <a:spAutoFit/>
-          </a:bodyPr>
-          <a:lstStyle/>
-          <a:p>
-            <a:pPr marL="0" lvl="2" algn="just"/>
-            <a:r>
-              <a:rPr lang="en-US" sz="990" b="1" dirty="0">
-                <a:latin typeface="Arial" charset="0"/>
-                <a:ea typeface="Arial" charset="0"/>
-                <a:cs typeface="Arial" charset="0"/>
-              </a:rPr>
-              <a:t>References</a:t>
-            </a:r>
-            <a:r>
-              <a:rPr lang="en-US" sz="990" dirty="0">
-                <a:latin typeface="Arial" charset="0"/>
-                <a:ea typeface="Arial" charset="0"/>
-                <a:cs typeface="Arial" charset="0"/>
-              </a:rPr>
-              <a:t>:</a:t>
-            </a:r>
-            <a:endParaRPr lang="de-DE" sz="990" dirty="0">
-              <a:latin typeface="Arial" charset="0"/>
-              <a:ea typeface="Arial" charset="0"/>
-              <a:cs typeface="Arial" charset="0"/>
-            </a:endParaRPr>
-          </a:p>
-        </p:txBody>
-      </p:sp>
-      <p:sp>
-        <p:nvSpPr>
-          <p:cNvPr id="60" name="Rectangle 163"/>
-          <p:cNvSpPr>
-            <a:spLocks noChangeArrowheads="1"/>
-          </p:cNvSpPr>
-          <p:nvPr/>
-        </p:nvSpPr>
-        <p:spPr bwMode="auto">
-          <a:xfrm>
-            <a:off x="21316690" y="5856247"/>
-            <a:ext cx="21495009" cy="846243"/>
-          </a:xfrm>
-          <a:prstGeom prst="rect">
-            <a:avLst/>
-          </a:prstGeom>
-          <a:gradFill>
-            <a:gsLst>
-              <a:gs pos="0">
-                <a:schemeClr val="tx2">
-                  <a:lumMod val="50000"/>
-                </a:schemeClr>
-              </a:gs>
-              <a:gs pos="50000">
-                <a:schemeClr val="tx2">
-                  <a:lumMod val="75000"/>
-                </a:schemeClr>
-              </a:gs>
-              <a:gs pos="100000">
-                <a:schemeClr val="tx2">
-                  <a:lumMod val="50000"/>
-                </a:schemeClr>
-              </a:gs>
-            </a:gsLst>
-            <a:lin ang="5400000" scaled="1"/>
-          </a:gradFill>
-          <a:ln w="9525">
-            <a:solidFill>
-              <a:schemeClr val="tx1"/>
-            </a:solidFill>
-            <a:miter lim="800000"/>
-            <a:headEnd/>
-            <a:tailEnd/>
-          </a:ln>
-          <a:effectLst/>
-        </p:spPr>
-        <p:txBody>
-          <a:bodyPr wrap="none" lIns="96996" tIns="48498" rIns="96996" bIns="48498" anchor="ctr"/>
-          <a:lstStyle/>
-          <a:p>
-            <a:pPr algn="just" defTabSz="2660888"/>
-            <a:endParaRPr lang="en-US" sz="1273" dirty="0">
-              <a:solidFill>
-                <a:schemeClr val="accent1"/>
-              </a:solidFill>
-              <a:latin typeface="Arial" panose="020B0604020202020204" pitchFamily="34" charset="0"/>
-              <a:cs typeface="Arial" panose="020B0604020202020204" pitchFamily="34" charset="0"/>
-            </a:endParaRPr>
-          </a:p>
-        </p:txBody>
-      </p:sp>
-      <p:sp>
-        <p:nvSpPr>
           <p:cNvPr id="8" name="Textfeld 7"/>
           <p:cNvSpPr txBox="1"/>
           <p:nvPr/>
@@ -3729,70 +3717,14 @@
       </p:sp>
       <p:sp>
         <p:nvSpPr>
-          <p:cNvPr id="61" name="Textfeld 60"/>
-          <p:cNvSpPr txBox="1"/>
+          <p:cNvPr id="33" name="Rechteck 32"/>
+          <p:cNvSpPr/>
           <p:nvPr/>
         </p:nvSpPr>
         <p:spPr>
           <a:xfrm>
-            <a:off x="21483642" y="6006734"/>
-            <a:ext cx="21328057" cy="636649"/>
-          </a:xfrm>
-          <a:prstGeom prst="rect">
-            <a:avLst/>
-          </a:prstGeom>
-          <a:noFill/>
-          <a:ln w="12700" cmpd="sng">
-            <a:noFill/>
-          </a:ln>
-        </p:spPr>
-        <p:txBody>
-          <a:bodyPr wrap="square" rtlCol="0">
-            <a:spAutoFit/>
-          </a:bodyPr>
-          <a:lstStyle/>
-          <a:p>
-            <a:pPr algn="just"/>
-            <a:r>
-              <a:rPr lang="en-US" sz="3537" b="1" dirty="0">
-                <a:solidFill>
-                  <a:srgbClr val="DCE6F2"/>
-                </a:solidFill>
-                <a:latin typeface="Arial" panose="020B0604020202020204" pitchFamily="34" charset="0"/>
-                <a:cs typeface="Arial" panose="020B0604020202020204" pitchFamily="34" charset="0"/>
-              </a:rPr>
-              <a:t>2. </a:t>
-            </a:r>
-            <a:r>
-              <a:rPr lang="en-US" sz="3537" b="1" dirty="0">
-                <a:solidFill>
-                  <a:srgbClr val="DCE6F2"/>
-                </a:solidFill>
-                <a:latin typeface="Arial" panose="020B0604020202020204" pitchFamily="34" charset="0"/>
-                <a:cs typeface="Arial" panose="020B0604020202020204" pitchFamily="34" charset="0"/>
-              </a:rPr>
-              <a:t>Methods</a:t>
-            </a:r>
-            <a:endParaRPr lang="en-US" sz="2829" dirty="0">
-              <a:solidFill>
-                <a:srgbClr val="000000"/>
-              </a:solidFill>
-              <a:latin typeface="Arial" panose="020B0604020202020204" pitchFamily="34" charset="0"/>
-              <a:cs typeface="Arial" panose="020B0604020202020204" pitchFamily="34" charset="0"/>
-            </a:endParaRPr>
-          </a:p>
-        </p:txBody>
-      </p:sp>
-      <p:sp>
-        <p:nvSpPr>
-          <p:cNvPr id="55" name="Rechteck 54"/>
-          <p:cNvSpPr/>
-          <p:nvPr/>
-        </p:nvSpPr>
-        <p:spPr>
-          <a:xfrm>
-            <a:off x="21316690" y="5850139"/>
-            <a:ext cx="21495009" cy="5801412"/>
+            <a:off x="1233713" y="5815536"/>
+            <a:ext cx="9344943" cy="5836015"/>
           </a:xfrm>
           <a:prstGeom prst="rect">
             <a:avLst/>
@@ -3833,62 +3765,14 @@
       </p:sp>
       <p:sp>
         <p:nvSpPr>
-          <p:cNvPr id="33" name="Rechteck 32"/>
-          <p:cNvSpPr/>
-          <p:nvPr/>
-        </p:nvSpPr>
-        <p:spPr>
-          <a:xfrm>
-            <a:off x="1" y="5815536"/>
-            <a:ext cx="21157312" cy="5836015"/>
-          </a:xfrm>
-          <a:prstGeom prst="rect">
-            <a:avLst/>
-          </a:prstGeom>
-          <a:noFill/>
-          <a:ln w="76200" cmpd="sng">
-            <a:solidFill>
-              <a:srgbClr val="4F81BD"/>
-            </a:solidFill>
-          </a:ln>
-          <a:effectLst/>
-        </p:spPr>
-        <p:style>
-          <a:lnRef idx="1">
-            <a:schemeClr val="accent1"/>
-          </a:lnRef>
-          <a:fillRef idx="3">
-            <a:schemeClr val="accent1"/>
-          </a:fillRef>
-          <a:effectRef idx="2">
-            <a:schemeClr val="accent1"/>
-          </a:effectRef>
-          <a:fontRef idx="minor">
-            <a:schemeClr val="lt1"/>
-          </a:fontRef>
-        </p:style>
-        <p:txBody>
-          <a:bodyPr rtlCol="0" anchor="ctr"/>
-          <a:lstStyle/>
-          <a:p>
-            <a:pPr algn="just"/>
-            <a:endParaRPr lang="en-US" sz="1273" dirty="0">
-              <a:latin typeface="Arial" panose="020B0604020202020204" pitchFamily="34" charset="0"/>
-              <a:cs typeface="Arial" panose="020B0604020202020204" pitchFamily="34" charset="0"/>
-            </a:endParaRPr>
-          </a:p>
-        </p:txBody>
-      </p:sp>
-      <p:sp>
-        <p:nvSpPr>
           <p:cNvPr id="46" name="Textfeld 45"/>
           <p:cNvSpPr txBox="1"/>
           <p:nvPr/>
         </p:nvSpPr>
         <p:spPr>
           <a:xfrm>
-            <a:off x="10420" y="5908820"/>
-            <a:ext cx="10182724" cy="636649"/>
+            <a:off x="1233714" y="5908821"/>
+            <a:ext cx="8959430" cy="636648"/>
           </a:xfrm>
           <a:prstGeom prst="rect">
             <a:avLst/>
@@ -3916,14 +3800,14 @@
               <a:t>1. </a:t>
             </a:r>
             <a:r>
-              <a:rPr lang="en-US" sz="3537" b="1" dirty="0">
+              <a:rPr lang="en-US" sz="3537" b="1" dirty="0" smtClean="0">
                 <a:solidFill>
                   <a:srgbClr val="DCE6F2"/>
                 </a:solidFill>
                 <a:latin typeface="Arial" panose="020B0604020202020204" pitchFamily="34" charset="0"/>
                 <a:cs typeface="Arial" panose="020B0604020202020204" pitchFamily="34" charset="0"/>
               </a:rPr>
-              <a:t>Theory</a:t>
+              <a:t>Motivation</a:t>
             </a:r>
             <a:endParaRPr lang="en-US" sz="2829" dirty="0">
               <a:solidFill>
@@ -4018,100 +3902,6 @@
       </p:sp>
       <p:sp>
         <p:nvSpPr>
-          <p:cNvPr id="50" name="Textfeld 49"/>
-          <p:cNvSpPr txBox="1"/>
-          <p:nvPr/>
-        </p:nvSpPr>
-        <p:spPr>
-          <a:xfrm>
-            <a:off x="24988185" y="22095459"/>
-            <a:ext cx="6351086" cy="3581761"/>
-          </a:xfrm>
-          <a:prstGeom prst="rect">
-            <a:avLst/>
-          </a:prstGeom>
-          <a:noFill/>
-          <a:effectLst/>
-        </p:spPr>
-        <p:txBody>
-          <a:bodyPr wrap="square" rtlCol="0">
-            <a:noAutofit/>
-          </a:bodyPr>
-          <a:lstStyle/>
-          <a:p>
-            <a:pPr marL="458077" indent="-323349" algn="just">
-              <a:buFont typeface="Arial" charset="0"/>
-              <a:buChar char="•"/>
-            </a:pPr>
-            <a:endParaRPr lang="de-DE" sz="2122" dirty="0">
-              <a:latin typeface="Arial" charset="0"/>
-              <a:ea typeface="Arial" charset="0"/>
-              <a:cs typeface="Arial" charset="0"/>
-            </a:endParaRPr>
-          </a:p>
-          <a:p>
-            <a:pPr marL="291912" indent="-157184" algn="just">
-              <a:buFont typeface="Arial" panose="020B0604020202020204" pitchFamily="34" charset="0"/>
-              <a:buChar char="•"/>
-            </a:pPr>
-            <a:endParaRPr lang="de-DE" sz="2122" dirty="0">
-              <a:latin typeface="Arial" charset="0"/>
-              <a:ea typeface="Arial" charset="0"/>
-              <a:cs typeface="Arial" charset="0"/>
-            </a:endParaRPr>
-          </a:p>
-        </p:txBody>
-      </p:sp>
-      <p:sp>
-        <p:nvSpPr>
-          <p:cNvPr id="67" name="Rechteck 66"/>
-          <p:cNvSpPr/>
-          <p:nvPr/>
-        </p:nvSpPr>
-        <p:spPr>
-          <a:xfrm>
-            <a:off x="10420" y="11790085"/>
-            <a:ext cx="42801280" cy="13083782"/>
-          </a:xfrm>
-          <a:prstGeom prst="rect">
-            <a:avLst/>
-          </a:prstGeom>
-          <a:noFill/>
-          <a:ln w="76200" cmpd="sng">
-            <a:solidFill>
-              <a:srgbClr val="4F81BD"/>
-            </a:solidFill>
-          </a:ln>
-          <a:effectLst/>
-        </p:spPr>
-        <p:style>
-          <a:lnRef idx="1">
-            <a:schemeClr val="accent1"/>
-          </a:lnRef>
-          <a:fillRef idx="3">
-            <a:schemeClr val="accent1"/>
-          </a:fillRef>
-          <a:effectRef idx="2">
-            <a:schemeClr val="accent1"/>
-          </a:effectRef>
-          <a:fontRef idx="minor">
-            <a:schemeClr val="lt1"/>
-          </a:fontRef>
-        </p:style>
-        <p:txBody>
-          <a:bodyPr rtlCol="0" anchor="ctr"/>
-          <a:lstStyle/>
-          <a:p>
-            <a:pPr algn="just"/>
-            <a:endParaRPr lang="en-US" sz="1273">
-              <a:latin typeface="Arial" panose="020B0604020202020204" pitchFamily="34" charset="0"/>
-              <a:cs typeface="Arial" panose="020B0604020202020204" pitchFamily="34" charset="0"/>
-            </a:endParaRPr>
-          </a:p>
-        </p:txBody>
-      </p:sp>
-      <p:sp>
-        <p:nvSpPr>
           <p:cNvPr id="45" name="Textfeld 44"/>
           <p:cNvSpPr txBox="1"/>
           <p:nvPr/>
@@ -4153,342 +3943,6 @@
           </a:p>
         </p:txBody>
       </p:sp>
-      <p:cxnSp>
-        <p:nvCxnSpPr>
-          <p:cNvPr id="42" name="Gerade Verbindung 40"/>
-          <p:cNvCxnSpPr/>
-          <p:nvPr/>
-        </p:nvCxnSpPr>
-        <p:spPr>
-          <a:xfrm>
-            <a:off x="21095856" y="24793344"/>
-            <a:ext cx="41677" cy="4374728"/>
-          </a:xfrm>
-          <a:prstGeom prst="line">
-            <a:avLst/>
-          </a:prstGeom>
-          <a:ln w="63500"/>
-          <a:effectLst/>
-        </p:spPr>
-        <p:style>
-          <a:lnRef idx="2">
-            <a:schemeClr val="accent1"/>
-          </a:lnRef>
-          <a:fillRef idx="0">
-            <a:schemeClr val="accent1"/>
-          </a:fillRef>
-          <a:effectRef idx="1">
-            <a:schemeClr val="accent1"/>
-          </a:effectRef>
-          <a:fontRef idx="minor">
-            <a:schemeClr val="tx1"/>
-          </a:fontRef>
-        </p:style>
-      </p:cxnSp>
-      <p:sp>
-        <p:nvSpPr>
-          <p:cNvPr id="35" name="Rechteck 34"/>
-          <p:cNvSpPr/>
-          <p:nvPr/>
-        </p:nvSpPr>
-        <p:spPr>
-          <a:xfrm>
-            <a:off x="10925400" y="24120492"/>
-            <a:ext cx="20659934" cy="5047581"/>
-          </a:xfrm>
-          <a:prstGeom prst="rect">
-            <a:avLst/>
-          </a:prstGeom>
-          <a:noFill/>
-          <a:ln w="76200" cmpd="sng">
-            <a:solidFill>
-              <a:srgbClr val="4F81BD"/>
-            </a:solidFill>
-          </a:ln>
-          <a:effectLst/>
-        </p:spPr>
-        <p:style>
-          <a:lnRef idx="1">
-            <a:schemeClr val="accent1"/>
-          </a:lnRef>
-          <a:fillRef idx="3">
-            <a:schemeClr val="accent1"/>
-          </a:fillRef>
-          <a:effectRef idx="2">
-            <a:schemeClr val="accent1"/>
-          </a:effectRef>
-          <a:fontRef idx="minor">
-            <a:schemeClr val="lt1"/>
-          </a:fontRef>
-        </p:style>
-        <p:txBody>
-          <a:bodyPr rtlCol="0" anchor="ctr"/>
-          <a:lstStyle/>
-          <a:p>
-            <a:pPr algn="just"/>
-            <a:endParaRPr lang="en-US" sz="1273">
-              <a:latin typeface="Arial" panose="020B0604020202020204" pitchFamily="34" charset="0"/>
-              <a:cs typeface="Arial" panose="020B0604020202020204" pitchFamily="34" charset="0"/>
-            </a:endParaRPr>
-          </a:p>
-        </p:txBody>
-      </p:sp>
-      <p:sp>
-        <p:nvSpPr>
-          <p:cNvPr id="54" name="Textfeld 53"/>
-          <p:cNvSpPr txBox="1">
-            <a:spLocks/>
-          </p:cNvSpPr>
-          <p:nvPr/>
-        </p:nvSpPr>
-        <p:spPr>
-          <a:xfrm>
-            <a:off x="11031454" y="22095459"/>
-            <a:ext cx="6704585" cy="3235619"/>
-          </a:xfrm>
-          <a:prstGeom prst="rect">
-            <a:avLst/>
-          </a:prstGeom>
-          <a:noFill/>
-          <a:effectLst/>
-        </p:spPr>
-        <p:txBody>
-          <a:bodyPr wrap="square" rtlCol="0">
-            <a:noAutofit/>
-          </a:bodyPr>
-          <a:lstStyle>
-            <a:defPPr>
-              <a:defRPr lang="de-DE"/>
-            </a:defPPr>
-            <a:lvl1pPr marL="412750" indent="-254000" algn="just">
-              <a:buFont typeface="Arial" charset="0"/>
-              <a:buChar char="•"/>
-              <a:defRPr sz="3500">
-                <a:latin typeface="Arial" panose="020B0604020202020204" pitchFamily="34" charset="0"/>
-                <a:cs typeface="Arial" panose="020B0604020202020204" pitchFamily="34" charset="0"/>
-              </a:defRPr>
-            </a:lvl1pPr>
-          </a:lstStyle>
-          <a:p>
-            <a:pPr marL="112274" indent="0">
-              <a:buNone/>
-            </a:pPr>
-            <a:endParaRPr lang="de-DE" sz="2122" dirty="0"/>
-          </a:p>
-          <a:p>
-            <a:pPr marL="112274" indent="0">
-              <a:buNone/>
-            </a:pPr>
-            <a:endParaRPr lang="de-DE" sz="2122" dirty="0"/>
-          </a:p>
-          <a:p>
-            <a:pPr marL="112274" indent="0">
-              <a:buNone/>
-            </a:pPr>
-            <a:endParaRPr lang="de-DE" sz="2122" dirty="0"/>
-          </a:p>
-          <a:p>
-            <a:pPr marL="112274" indent="0">
-              <a:buNone/>
-            </a:pPr>
-            <a:endParaRPr lang="de-DE" sz="2122" dirty="0"/>
-          </a:p>
-          <a:p>
-            <a:endParaRPr lang="de-DE" sz="2122" dirty="0"/>
-          </a:p>
-        </p:txBody>
-      </p:sp>
-      <p:sp>
-        <p:nvSpPr>
-          <p:cNvPr id="36" name="Textfeld 35"/>
-          <p:cNvSpPr txBox="1"/>
-          <p:nvPr/>
-        </p:nvSpPr>
-        <p:spPr>
-          <a:xfrm>
-            <a:off x="11060141" y="24183373"/>
-            <a:ext cx="19880583" cy="636649"/>
-          </a:xfrm>
-          <a:prstGeom prst="rect">
-            <a:avLst/>
-          </a:prstGeom>
-          <a:noFill/>
-          <a:effectLst/>
-        </p:spPr>
-        <p:txBody>
-          <a:bodyPr wrap="square" rtlCol="0">
-            <a:spAutoFit/>
-          </a:bodyPr>
-          <a:lstStyle/>
-          <a:p>
-            <a:pPr algn="just"/>
-            <a:r>
-              <a:rPr lang="en-US" sz="3537" b="1" dirty="0">
-                <a:solidFill>
-                  <a:srgbClr val="DCE6F2"/>
-                </a:solidFill>
-                <a:latin typeface="Arial" panose="020B0604020202020204" pitchFamily="34" charset="0"/>
-                <a:cs typeface="Arial" panose="020B0604020202020204" pitchFamily="34" charset="0"/>
-              </a:rPr>
-              <a:t>Discussion</a:t>
-            </a:r>
-            <a:endParaRPr lang="en-US" sz="3537" b="1" dirty="0">
-              <a:solidFill>
-                <a:srgbClr val="DCE6F2"/>
-              </a:solidFill>
-              <a:latin typeface="Arial" panose="020B0604020202020204" pitchFamily="34" charset="0"/>
-              <a:cs typeface="Arial" panose="020B0604020202020204" pitchFamily="34" charset="0"/>
-            </a:endParaRPr>
-          </a:p>
-        </p:txBody>
-      </p:sp>
-      <p:cxnSp>
-        <p:nvCxnSpPr>
-          <p:cNvPr id="16" name="Gerade Verbindung 15"/>
-          <p:cNvCxnSpPr/>
-          <p:nvPr/>
-        </p:nvCxnSpPr>
-        <p:spPr>
-          <a:xfrm flipV="1">
-            <a:off x="10420" y="17496898"/>
-            <a:ext cx="42801279" cy="1"/>
-          </a:xfrm>
-          <a:prstGeom prst="line">
-            <a:avLst/>
-          </a:prstGeom>
-          <a:ln w="38100"/>
-        </p:spPr>
-        <p:style>
-          <a:lnRef idx="2">
-            <a:schemeClr val="accent1"/>
-          </a:lnRef>
-          <a:fillRef idx="0">
-            <a:schemeClr val="accent1"/>
-          </a:fillRef>
-          <a:effectRef idx="1">
-            <a:schemeClr val="accent1"/>
-          </a:effectRef>
-          <a:fontRef idx="minor">
-            <a:schemeClr val="tx1"/>
-          </a:fontRef>
-        </p:style>
-      </p:cxnSp>
-      <p:sp>
-        <p:nvSpPr>
-          <p:cNvPr id="28" name="Textfeld 27"/>
-          <p:cNvSpPr txBox="1"/>
-          <p:nvPr/>
-        </p:nvSpPr>
-        <p:spPr>
-          <a:xfrm>
-            <a:off x="21359454" y="6756335"/>
-            <a:ext cx="21452246" cy="5103550"/>
-          </a:xfrm>
-          <a:prstGeom prst="rect">
-            <a:avLst/>
-          </a:prstGeom>
-          <a:noFill/>
-          <a:effectLst/>
-        </p:spPr>
-        <p:txBody>
-          <a:bodyPr wrap="square" rtlCol="0">
-            <a:noAutofit/>
-          </a:bodyPr>
-          <a:lstStyle/>
-          <a:p>
-            <a:pPr marL="404185" indent="-269457" algn="just">
-              <a:buFont typeface="Arial" charset="0"/>
-              <a:buChar char="•"/>
-            </a:pPr>
-            <a:endParaRPr lang="de-DE" sz="2122" dirty="0">
-              <a:latin typeface="Times New Roman" charset="0"/>
-              <a:ea typeface="Times New Roman" charset="0"/>
-              <a:cs typeface="Times New Roman" charset="0"/>
-            </a:endParaRPr>
-          </a:p>
-          <a:p>
-            <a:pPr marL="404185" indent="-269457" algn="just">
-              <a:buFont typeface="Arial" charset="0"/>
-              <a:buChar char="•"/>
-            </a:pPr>
-            <a:endParaRPr lang="de-DE" sz="2122" dirty="0">
-              <a:latin typeface="Times New Roman" charset="0"/>
-              <a:ea typeface="Times New Roman" charset="0"/>
-              <a:cs typeface="Times New Roman" charset="0"/>
-            </a:endParaRPr>
-          </a:p>
-        </p:txBody>
-      </p:sp>
-      <p:sp>
-        <p:nvSpPr>
-          <p:cNvPr id="30" name="Textfeld 29"/>
-          <p:cNvSpPr txBox="1"/>
-          <p:nvPr/>
-        </p:nvSpPr>
-        <p:spPr>
-          <a:xfrm>
-            <a:off x="10193144" y="11337257"/>
-            <a:ext cx="10176309" cy="5344523"/>
-          </a:xfrm>
-          <a:prstGeom prst="rect">
-            <a:avLst/>
-          </a:prstGeom>
-          <a:noFill/>
-          <a:effectLst/>
-        </p:spPr>
-        <p:txBody>
-          <a:bodyPr wrap="square" rtlCol="0">
-            <a:noAutofit/>
-          </a:bodyPr>
-          <a:lstStyle/>
-          <a:p>
-            <a:pPr marL="404185" indent="-269457" algn="just">
-              <a:buFont typeface="Arial" charset="0"/>
-              <a:buChar char="•"/>
-            </a:pPr>
-            <a:endParaRPr lang="sv-SE" sz="1980" dirty="0">
-              <a:solidFill>
-                <a:srgbClr val="FF0000"/>
-              </a:solidFill>
-              <a:latin typeface="Times New Roman" charset="0"/>
-              <a:ea typeface="Times New Roman" charset="0"/>
-              <a:cs typeface="Times New Roman" charset="0"/>
-            </a:endParaRPr>
-          </a:p>
-        </p:txBody>
-      </p:sp>
-      <p:cxnSp>
-        <p:nvCxnSpPr>
-          <p:cNvPr id="37" name="Gerade Verbindung 40"/>
-          <p:cNvCxnSpPr/>
-          <p:nvPr/>
-        </p:nvCxnSpPr>
-        <p:spPr>
-          <a:xfrm>
-            <a:off x="21034030" y="17496898"/>
-            <a:ext cx="23453" cy="6575372"/>
-          </a:xfrm>
-          <a:prstGeom prst="line">
-            <a:avLst/>
-          </a:prstGeom>
-          <a:ln w="63500"/>
-          <a:effectLst/>
-        </p:spPr>
-        <p:style>
-          <a:lnRef idx="2">
-            <a:schemeClr val="accent1"/>
-          </a:lnRef>
-          <a:fillRef idx="0">
-            <a:schemeClr val="accent1"/>
-          </a:fillRef>
-          <a:effectRef idx="1">
-            <a:schemeClr val="accent1"/>
-          </a:effectRef>
-          <a:fontRef idx="minor">
-            <a:schemeClr val="tx1"/>
-          </a:fontRef>
-        </p:style>
-      </p:cxnSp>
       <p:pic>
         <p:nvPicPr>
           <p:cNvPr id="9" name="Bild 8"/>
@@ -4551,44 +4005,2678 @@
       </p:pic>
       <p:sp>
         <p:nvSpPr>
-          <p:cNvPr id="43" name="Textfeld 42"/>
-          <p:cNvSpPr txBox="1"/>
+          <p:cNvPr id="59" name="Rectangle 163"/>
+          <p:cNvSpPr>
+            <a:spLocks noChangeArrowheads="1"/>
+          </p:cNvSpPr>
+          <p:nvPr/>
+        </p:nvSpPr>
+        <p:spPr bwMode="auto">
+          <a:xfrm>
+            <a:off x="11532520" y="15332641"/>
+            <a:ext cx="9344944" cy="869557"/>
+          </a:xfrm>
+          <a:prstGeom prst="rect">
+            <a:avLst/>
+          </a:prstGeom>
+          <a:gradFill>
+            <a:gsLst>
+              <a:gs pos="0">
+                <a:schemeClr val="tx2">
+                  <a:lumMod val="50000"/>
+                </a:schemeClr>
+              </a:gs>
+              <a:gs pos="50000">
+                <a:schemeClr val="tx2">
+                  <a:lumMod val="75000"/>
+                </a:schemeClr>
+              </a:gs>
+              <a:gs pos="100000">
+                <a:schemeClr val="tx2">
+                  <a:lumMod val="50000"/>
+                </a:schemeClr>
+              </a:gs>
+            </a:gsLst>
+            <a:lin ang="5400000" scaled="1"/>
+          </a:gradFill>
+          <a:ln w="9525">
+            <a:solidFill>
+              <a:schemeClr val="tx1"/>
+            </a:solidFill>
+            <a:miter lim="800000"/>
+            <a:headEnd/>
+            <a:tailEnd/>
+          </a:ln>
+          <a:effectLst/>
+        </p:spPr>
+        <p:txBody>
+          <a:bodyPr wrap="none" lIns="96996" tIns="48498" rIns="96996" bIns="48498" anchor="ctr"/>
+          <a:lstStyle/>
+          <a:p>
+            <a:pPr algn="just" defTabSz="2660888"/>
+            <a:endParaRPr lang="en-US" sz="1273" dirty="0">
+              <a:solidFill>
+                <a:schemeClr val="accent1"/>
+              </a:solidFill>
+              <a:latin typeface="Arial" panose="020B0604020202020204" pitchFamily="34" charset="0"/>
+              <a:cs typeface="Arial" panose="020B0604020202020204" pitchFamily="34" charset="0"/>
+            </a:endParaRPr>
+          </a:p>
+        </p:txBody>
+      </p:sp>
+      <p:sp>
+        <p:nvSpPr>
+          <p:cNvPr id="62" name="Rectangle 163"/>
+          <p:cNvSpPr>
+            <a:spLocks noChangeArrowheads="1"/>
+          </p:cNvSpPr>
+          <p:nvPr/>
+        </p:nvSpPr>
+        <p:spPr bwMode="auto">
+          <a:xfrm>
+            <a:off x="1233714" y="15332641"/>
+            <a:ext cx="9323484" cy="869557"/>
+          </a:xfrm>
+          <a:prstGeom prst="rect">
+            <a:avLst/>
+          </a:prstGeom>
+          <a:gradFill>
+            <a:gsLst>
+              <a:gs pos="0">
+                <a:schemeClr val="tx2">
+                  <a:lumMod val="50000"/>
+                </a:schemeClr>
+              </a:gs>
+              <a:gs pos="50000">
+                <a:schemeClr val="tx2">
+                  <a:lumMod val="75000"/>
+                </a:schemeClr>
+              </a:gs>
+              <a:gs pos="100000">
+                <a:schemeClr val="tx2">
+                  <a:lumMod val="50000"/>
+                </a:schemeClr>
+              </a:gs>
+            </a:gsLst>
+            <a:lin ang="5400000" scaled="1"/>
+          </a:gradFill>
+          <a:ln w="9525">
+            <a:solidFill>
+              <a:schemeClr val="tx1"/>
+            </a:solidFill>
+            <a:miter lim="800000"/>
+            <a:headEnd/>
+            <a:tailEnd/>
+          </a:ln>
+          <a:effectLst/>
+        </p:spPr>
+        <p:txBody>
+          <a:bodyPr wrap="none" lIns="96996" tIns="48498" rIns="96996" bIns="48498" anchor="ctr"/>
+          <a:lstStyle/>
+          <a:p>
+            <a:pPr algn="just" defTabSz="2660888"/>
+            <a:endParaRPr lang="en-US" sz="1273" dirty="0">
+              <a:solidFill>
+                <a:schemeClr val="accent1"/>
+              </a:solidFill>
+              <a:latin typeface="Arial" panose="020B0604020202020204" pitchFamily="34" charset="0"/>
+              <a:cs typeface="Arial" panose="020B0604020202020204" pitchFamily="34" charset="0"/>
+            </a:endParaRPr>
+          </a:p>
+        </p:txBody>
+      </p:sp>
+      <p:sp>
+        <p:nvSpPr>
+          <p:cNvPr id="63" name="Rechteck 62"/>
+          <p:cNvSpPr/>
           <p:nvPr/>
         </p:nvSpPr>
         <p:spPr>
           <a:xfrm>
-            <a:off x="10841439" y="24885098"/>
-            <a:ext cx="10174417" cy="4027599"/>
+            <a:off x="1233713" y="15298038"/>
+            <a:ext cx="9323483" cy="10256542"/>
           </a:xfrm>
           <a:prstGeom prst="rect">
             <a:avLst/>
           </a:prstGeom>
           <a:noFill/>
+          <a:ln w="76200" cmpd="sng">
+            <a:solidFill>
+              <a:srgbClr val="4F81BD"/>
+            </a:solidFill>
+          </a:ln>
           <a:effectLst/>
         </p:spPr>
+        <p:style>
+          <a:lnRef idx="1">
+            <a:schemeClr val="accent1"/>
+          </a:lnRef>
+          <a:fillRef idx="3">
+            <a:schemeClr val="accent1"/>
+          </a:fillRef>
+          <a:effectRef idx="2">
+            <a:schemeClr val="accent1"/>
+          </a:effectRef>
+          <a:fontRef idx="minor">
+            <a:schemeClr val="lt1"/>
+          </a:fontRef>
+        </p:style>
+        <p:txBody>
+          <a:bodyPr rtlCol="0" anchor="ctr"/>
+          <a:lstStyle/>
+          <a:p>
+            <a:pPr algn="just"/>
+            <a:endParaRPr lang="en-US" sz="1273" dirty="0">
+              <a:latin typeface="Arial" panose="020B0604020202020204" pitchFamily="34" charset="0"/>
+              <a:cs typeface="Arial" panose="020B0604020202020204" pitchFamily="34" charset="0"/>
+            </a:endParaRPr>
+          </a:p>
+        </p:txBody>
+      </p:sp>
+      <p:sp>
+        <p:nvSpPr>
+          <p:cNvPr id="64" name="Textfeld 63"/>
+          <p:cNvSpPr txBox="1"/>
+          <p:nvPr/>
+        </p:nvSpPr>
+        <p:spPr>
+          <a:xfrm>
+            <a:off x="1233714" y="15391322"/>
+            <a:ext cx="8937970" cy="636649"/>
+          </a:xfrm>
+          <a:prstGeom prst="rect">
+            <a:avLst/>
+          </a:prstGeom>
+          <a:noFill/>
+          <a:ln w="12700" cmpd="sng">
+            <a:noFill/>
+          </a:ln>
+        </p:spPr>
         <p:txBody>
           <a:bodyPr wrap="square" rtlCol="0">
-            <a:noAutofit/>
+            <a:spAutoFit/>
           </a:bodyPr>
           <a:lstStyle/>
           <a:p>
-            <a:pPr marL="112274" algn="just"/>
-            <a:endParaRPr lang="de-DE" sz="2122" dirty="0">
-              <a:latin typeface="Arial" charset="0"/>
-              <a:ea typeface="Arial" charset="0"/>
-              <a:cs typeface="Arial" charset="0"/>
+            <a:pPr algn="just"/>
+            <a:r>
+              <a:rPr lang="en-US" sz="3537" b="1" dirty="0" smtClean="0">
+                <a:solidFill>
+                  <a:srgbClr val="DCE6F2"/>
+                </a:solidFill>
+                <a:latin typeface="Arial" panose="020B0604020202020204" pitchFamily="34" charset="0"/>
+                <a:cs typeface="Arial" panose="020B0604020202020204" pitchFamily="34" charset="0"/>
+              </a:rPr>
+              <a:t>2. EM algorithm</a:t>
+            </a:r>
+            <a:endParaRPr lang="en-US" sz="2829" dirty="0">
+              <a:solidFill>
+                <a:srgbClr val="000000"/>
+              </a:solidFill>
+              <a:latin typeface="Arial" panose="020B0604020202020204" pitchFamily="34" charset="0"/>
+              <a:cs typeface="Arial" panose="020B0604020202020204" pitchFamily="34" charset="0"/>
             </a:endParaRPr>
           </a:p>
-          <a:p>
-            <a:pPr marL="404185" indent="-291912" algn="just">
-              <a:buFont typeface="Arial" charset="0"/>
+        </p:txBody>
+      </p:sp>
+      <p:sp>
+        <p:nvSpPr>
+          <p:cNvPr id="65" name="Rechteck 64"/>
+          <p:cNvSpPr/>
+          <p:nvPr/>
+        </p:nvSpPr>
+        <p:spPr>
+          <a:xfrm>
+            <a:off x="11532518" y="15298038"/>
+            <a:ext cx="9344945" cy="13010262"/>
+          </a:xfrm>
+          <a:prstGeom prst="rect">
+            <a:avLst/>
+          </a:prstGeom>
+          <a:noFill/>
+          <a:ln w="76200" cmpd="sng">
+            <a:solidFill>
+              <a:srgbClr val="4F81BD"/>
+            </a:solidFill>
+          </a:ln>
+          <a:effectLst/>
+        </p:spPr>
+        <p:style>
+          <a:lnRef idx="1">
+            <a:schemeClr val="accent1"/>
+          </a:lnRef>
+          <a:fillRef idx="3">
+            <a:schemeClr val="accent1"/>
+          </a:fillRef>
+          <a:effectRef idx="2">
+            <a:schemeClr val="accent1"/>
+          </a:effectRef>
+          <a:fontRef idx="minor">
+            <a:schemeClr val="lt1"/>
+          </a:fontRef>
+        </p:style>
+        <p:txBody>
+          <a:bodyPr rtlCol="0" anchor="ctr"/>
+          <a:lstStyle/>
+          <a:p>
+            <a:pPr algn="just"/>
+            <a:endParaRPr lang="en-US" sz="1273" dirty="0">
+              <a:latin typeface="Arial" panose="020B0604020202020204" pitchFamily="34" charset="0"/>
+              <a:cs typeface="Arial" panose="020B0604020202020204" pitchFamily="34" charset="0"/>
+            </a:endParaRPr>
+          </a:p>
+        </p:txBody>
+      </p:sp>
+      <p:sp>
+        <p:nvSpPr>
+          <p:cNvPr id="66" name="Rectangle 163"/>
+          <p:cNvSpPr>
+            <a:spLocks noChangeArrowheads="1"/>
+          </p:cNvSpPr>
+          <p:nvPr/>
+        </p:nvSpPr>
+        <p:spPr bwMode="auto">
+          <a:xfrm>
+            <a:off x="32178496" y="22506888"/>
+            <a:ext cx="9344944" cy="848980"/>
+          </a:xfrm>
+          <a:prstGeom prst="rect">
+            <a:avLst/>
+          </a:prstGeom>
+          <a:gradFill>
+            <a:gsLst>
+              <a:gs pos="0">
+                <a:schemeClr val="tx2">
+                  <a:lumMod val="50000"/>
+                </a:schemeClr>
+              </a:gs>
+              <a:gs pos="50000">
+                <a:schemeClr val="tx2">
+                  <a:lumMod val="75000"/>
+                </a:schemeClr>
+              </a:gs>
+              <a:gs pos="100000">
+                <a:schemeClr val="tx2">
+                  <a:lumMod val="50000"/>
+                </a:schemeClr>
+              </a:gs>
+            </a:gsLst>
+            <a:lin ang="5400000" scaled="1"/>
+          </a:gradFill>
+          <a:ln w="9525">
+            <a:solidFill>
+              <a:schemeClr val="tx1"/>
+            </a:solidFill>
+            <a:miter lim="800000"/>
+            <a:headEnd/>
+            <a:tailEnd/>
+          </a:ln>
+          <a:effectLst/>
+        </p:spPr>
+        <p:txBody>
+          <a:bodyPr wrap="none" lIns="96996" tIns="48498" rIns="96996" bIns="48498" anchor="ctr"/>
+          <a:lstStyle/>
+          <a:p>
+            <a:pPr algn="just" defTabSz="2660888"/>
+            <a:endParaRPr lang="en-US" sz="1273" dirty="0">
+              <a:solidFill>
+                <a:schemeClr val="accent1"/>
+              </a:solidFill>
+              <a:latin typeface="Arial" panose="020B0604020202020204" pitchFamily="34" charset="0"/>
+              <a:cs typeface="Arial" panose="020B0604020202020204" pitchFamily="34" charset="0"/>
+            </a:endParaRPr>
+          </a:p>
+        </p:txBody>
+      </p:sp>
+      <p:sp>
+        <p:nvSpPr>
+          <p:cNvPr id="76" name="Rechteck 75"/>
+          <p:cNvSpPr/>
+          <p:nvPr/>
+        </p:nvSpPr>
+        <p:spPr>
+          <a:xfrm>
+            <a:off x="32178495" y="22472285"/>
+            <a:ext cx="9344944" cy="5836015"/>
+          </a:xfrm>
+          <a:prstGeom prst="rect">
+            <a:avLst/>
+          </a:prstGeom>
+          <a:noFill/>
+          <a:ln w="76200" cmpd="sng">
+            <a:solidFill>
+              <a:srgbClr val="4F81BD"/>
+            </a:solidFill>
+          </a:ln>
+          <a:effectLst/>
+        </p:spPr>
+        <p:style>
+          <a:lnRef idx="1">
+            <a:schemeClr val="accent1"/>
+          </a:lnRef>
+          <a:fillRef idx="3">
+            <a:schemeClr val="accent1"/>
+          </a:fillRef>
+          <a:effectRef idx="2">
+            <a:schemeClr val="accent1"/>
+          </a:effectRef>
+          <a:fontRef idx="minor">
+            <a:schemeClr val="lt1"/>
+          </a:fontRef>
+        </p:style>
+        <p:txBody>
+          <a:bodyPr rtlCol="0" anchor="ctr"/>
+          <a:lstStyle/>
+          <a:p>
+            <a:pPr algn="just"/>
+            <a:endParaRPr lang="en-US" sz="1273" dirty="0">
+              <a:latin typeface="Arial" panose="020B0604020202020204" pitchFamily="34" charset="0"/>
+              <a:cs typeface="Arial" panose="020B0604020202020204" pitchFamily="34" charset="0"/>
+            </a:endParaRPr>
+          </a:p>
+        </p:txBody>
+      </p:sp>
+      <p:sp>
+        <p:nvSpPr>
+          <p:cNvPr id="88" name="Textfeld 87"/>
+          <p:cNvSpPr txBox="1"/>
+          <p:nvPr/>
+        </p:nvSpPr>
+        <p:spPr>
+          <a:xfrm>
+            <a:off x="11532519" y="15427892"/>
+            <a:ext cx="9473359" cy="636649"/>
+          </a:xfrm>
+          <a:prstGeom prst="rect">
+            <a:avLst/>
+          </a:prstGeom>
+          <a:noFill/>
+          <a:ln w="12700" cmpd="sng">
+            <a:noFill/>
+          </a:ln>
+        </p:spPr>
+        <p:txBody>
+          <a:bodyPr wrap="square" rtlCol="0">
+            <a:spAutoFit/>
+          </a:bodyPr>
+          <a:lstStyle/>
+          <a:p>
+            <a:pPr algn="just"/>
+            <a:r>
+              <a:rPr lang="en-US" sz="3537" b="1" dirty="0" smtClean="0">
+                <a:solidFill>
+                  <a:srgbClr val="DCE6F2"/>
+                </a:solidFill>
+                <a:latin typeface="Arial" panose="020B0604020202020204" pitchFamily="34" charset="0"/>
+                <a:cs typeface="Arial" panose="020B0604020202020204" pitchFamily="34" charset="0"/>
+              </a:rPr>
+              <a:t>4. Simulation study</a:t>
+            </a:r>
+            <a:endParaRPr lang="en-US" sz="2829" dirty="0">
+              <a:solidFill>
+                <a:srgbClr val="000000"/>
+              </a:solidFill>
+              <a:latin typeface="Arial" panose="020B0604020202020204" pitchFamily="34" charset="0"/>
+              <a:cs typeface="Arial" panose="020B0604020202020204" pitchFamily="34" charset="0"/>
+            </a:endParaRPr>
+          </a:p>
+        </p:txBody>
+      </p:sp>
+      <p:sp>
+        <p:nvSpPr>
+          <p:cNvPr id="90" name="Textfeld 89"/>
+          <p:cNvSpPr txBox="1"/>
+          <p:nvPr/>
+        </p:nvSpPr>
+        <p:spPr>
+          <a:xfrm>
+            <a:off x="32178495" y="22581562"/>
+            <a:ext cx="10351485" cy="636649"/>
+          </a:xfrm>
+          <a:prstGeom prst="rect">
+            <a:avLst/>
+          </a:prstGeom>
+          <a:noFill/>
+          <a:ln w="12700" cmpd="sng">
+            <a:noFill/>
+          </a:ln>
+        </p:spPr>
+        <p:txBody>
+          <a:bodyPr wrap="square" rtlCol="0">
+            <a:spAutoFit/>
+          </a:bodyPr>
+          <a:lstStyle/>
+          <a:p>
+            <a:pPr algn="just"/>
+            <a:r>
+              <a:rPr lang="en-US" sz="3537" b="1" dirty="0" smtClean="0">
+                <a:solidFill>
+                  <a:srgbClr val="DCE6F2"/>
+                </a:solidFill>
+                <a:latin typeface="Arial" panose="020B0604020202020204" pitchFamily="34" charset="0"/>
+                <a:cs typeface="Arial" panose="020B0604020202020204" pitchFamily="34" charset="0"/>
+              </a:rPr>
+              <a:t>References</a:t>
+            </a:r>
+            <a:endParaRPr lang="en-US" sz="2829" dirty="0">
+              <a:solidFill>
+                <a:srgbClr val="000000"/>
+              </a:solidFill>
+              <a:latin typeface="Arial" panose="020B0604020202020204" pitchFamily="34" charset="0"/>
+              <a:cs typeface="Arial" panose="020B0604020202020204" pitchFamily="34" charset="0"/>
+            </a:endParaRPr>
+          </a:p>
+        </p:txBody>
+      </p:sp>
+      <p:sp>
+        <p:nvSpPr>
+          <p:cNvPr id="2" name="Textfeld 1"/>
+          <p:cNvSpPr txBox="1"/>
+          <p:nvPr/>
+        </p:nvSpPr>
+        <p:spPr>
+          <a:xfrm>
+            <a:off x="1233714" y="6697869"/>
+            <a:ext cx="9344942" cy="4431983"/>
+          </a:xfrm>
+          <a:prstGeom prst="rect">
+            <a:avLst/>
+          </a:prstGeom>
+          <a:noFill/>
+        </p:spPr>
+        <p:txBody>
+          <a:bodyPr wrap="square" rtlCol="0">
+            <a:spAutoFit/>
+          </a:bodyPr>
+          <a:lstStyle/>
+          <a:p>
+            <a:pPr marL="285750" indent="-285750">
+              <a:spcAft>
+                <a:spcPts val="1200"/>
+              </a:spcAft>
+              <a:buFont typeface="Arial" pitchFamily="34" charset="0"/>
               <a:buChar char="•"/>
             </a:pPr>
-            <a:endParaRPr lang="en-US" sz="2122" dirty="0">
-              <a:latin typeface="Arial" charset="0"/>
-              <a:ea typeface="Arial" charset="0"/>
-              <a:cs typeface="Arial" charset="0"/>
+            <a:r>
+              <a:rPr lang="en-GB" sz="3200" dirty="0" smtClean="0"/>
+              <a:t>No asymptotic variance-covariance matrix computed when running expectation maximization algorithm</a:t>
+            </a:r>
+            <a:r>
+              <a:rPr lang="en-GB" sz="3200" dirty="0"/>
+              <a:t> (EM)</a:t>
+            </a:r>
+            <a:r>
+              <a:rPr lang="en-GB" sz="3200" dirty="0" smtClean="0"/>
+              <a:t>. </a:t>
+            </a:r>
+          </a:p>
+          <a:p>
+            <a:pPr marL="285750" indent="-285750">
+              <a:spcAft>
+                <a:spcPts val="1200"/>
+              </a:spcAft>
+              <a:buFont typeface="Arial" pitchFamily="34" charset="0"/>
+              <a:buChar char="•"/>
+            </a:pPr>
+            <a:r>
+              <a:rPr lang="en-GB" sz="3200" dirty="0" smtClean="0"/>
+              <a:t>Such matrix is however needed for (asymptotically valid) inference</a:t>
+            </a:r>
+          </a:p>
+          <a:p>
+            <a:pPr marL="285750" indent="-285750">
+              <a:spcAft>
+                <a:spcPts val="1200"/>
+              </a:spcAft>
+              <a:buFont typeface="Arial" pitchFamily="34" charset="0"/>
+              <a:buChar char="•"/>
+            </a:pPr>
+            <a:r>
+              <a:rPr lang="en-GB" sz="3200" dirty="0" smtClean="0"/>
+              <a:t>Existing approaches not computationally problematic and not generically applicable</a:t>
+            </a:r>
+          </a:p>
+          <a:p>
+            <a:pPr marL="285750" indent="-285750">
+              <a:spcAft>
+                <a:spcPts val="1200"/>
+              </a:spcAft>
+              <a:buFont typeface="Arial" pitchFamily="34" charset="0"/>
+              <a:buChar char="•"/>
+            </a:pPr>
+            <a:endParaRPr lang="en-GB" sz="2800" dirty="0"/>
+          </a:p>
+        </p:txBody>
+      </p:sp>
+      <mc:AlternateContent xmlns:mc="http://schemas.openxmlformats.org/markup-compatibility/2006">
+        <mc:Choice xmlns:a14="http://schemas.microsoft.com/office/drawing/2010/main" Requires="a14">
+          <p:sp>
+            <p:nvSpPr>
+              <p:cNvPr id="91" name="Textfeld 90"/>
+              <p:cNvSpPr txBox="1"/>
+              <p:nvPr/>
+            </p:nvSpPr>
+            <p:spPr>
+              <a:xfrm>
+                <a:off x="1233714" y="16202198"/>
+                <a:ext cx="9344944" cy="9150197"/>
+              </a:xfrm>
+              <a:prstGeom prst="rect">
+                <a:avLst/>
+              </a:prstGeom>
+              <a:noFill/>
+            </p:spPr>
+            <p:txBody>
+              <a:bodyPr wrap="square" rtlCol="0">
+                <a:spAutoFit/>
+              </a:bodyPr>
+              <a:lstStyle/>
+              <a:p>
+                <a:pPr marL="285750" indent="-285750">
+                  <a:spcAft>
+                    <a:spcPts val="1200"/>
+                  </a:spcAft>
+                  <a:buFont typeface="Arial" pitchFamily="34" charset="0"/>
+                  <a:buChar char="•"/>
+                </a:pPr>
+                <a:r>
+                  <a:rPr lang="en-GB" sz="3200" dirty="0" smtClean="0"/>
+                  <a:t>Iterative technique to find the maximum likelihood parameters</a:t>
+                </a:r>
+              </a:p>
+              <a:p>
+                <a:pPr marL="285750" indent="-285750">
+                  <a:spcAft>
+                    <a:spcPts val="1200"/>
+                  </a:spcAft>
+                  <a:buFont typeface="Arial" pitchFamily="34" charset="0"/>
+                  <a:buChar char="•"/>
+                </a:pPr>
+                <a:r>
+                  <a:rPr lang="en-GB" sz="3200" dirty="0" smtClean="0"/>
+                  <a:t>Used in problems where the equations are not directly solvable, like in incomplete-data problems</a:t>
+                </a:r>
+              </a:p>
+              <a:p>
+                <a:pPr marL="285750" indent="-285750">
+                  <a:spcAft>
+                    <a:spcPts val="1200"/>
+                  </a:spcAft>
+                  <a:buFont typeface="Arial" pitchFamily="34" charset="0"/>
+                  <a:buChar char="•"/>
+                </a:pPr>
+                <a:r>
+                  <a:rPr lang="en-GB" sz="3200" dirty="0" smtClean="0"/>
+                  <a:t>EM algorithm consists of two steps, the expectation step and the maximization step</a:t>
+                </a:r>
+              </a:p>
+              <a:p>
+                <a:pPr marL="285750" indent="-285750">
+                  <a:spcAft>
+                    <a:spcPts val="1200"/>
+                  </a:spcAft>
+                  <a:buFont typeface="Arial" pitchFamily="34" charset="0"/>
+                  <a:buChar char="•"/>
+                </a:pPr>
+                <a:r>
+                  <a:rPr lang="en-GB" sz="3200" dirty="0" smtClean="0"/>
+                  <a:t>E-step calculates</a:t>
+                </a:r>
+              </a:p>
+              <a:p>
+                <a:pPr lvl="2">
+                  <a:spcAft>
+                    <a:spcPts val="1200"/>
+                  </a:spcAft>
+                </a:pPr>
+                <a14:m>
+                  <m:oMathPara xmlns:m="http://schemas.openxmlformats.org/officeDocument/2006/math">
+                    <m:oMathParaPr>
+                      <m:jc m:val="centerGroup"/>
+                    </m:oMathParaPr>
+                    <m:oMath xmlns:m="http://schemas.openxmlformats.org/officeDocument/2006/math">
+                      <m:r>
+                        <a:rPr lang="de-DE" sz="3200" b="0" i="1" smtClean="0">
+                          <a:latin typeface="Cambria Math"/>
+                        </a:rPr>
+                        <m:t>𝑄</m:t>
+                      </m:r>
+                      <m:d>
+                        <m:dPr>
+                          <m:ctrlPr>
+                            <a:rPr lang="de-DE" sz="3200" b="0" i="1" smtClean="0">
+                              <a:latin typeface="Cambria Math"/>
+                            </a:rPr>
+                          </m:ctrlPr>
+                        </m:dPr>
+                        <m:e>
+                          <m:r>
+                            <a:rPr lang="de-DE" sz="3200" b="0" i="1" smtClean="0">
+                              <a:latin typeface="Cambria Math"/>
+                              <a:ea typeface="Cambria Math"/>
+                            </a:rPr>
+                            <m:t>𝜃</m:t>
+                          </m:r>
+                        </m:e>
+                        <m:e>
+                          <m:sSup>
+                            <m:sSupPr>
+                              <m:ctrlPr>
+                                <a:rPr lang="de-DE" sz="3200" i="1" smtClean="0">
+                                  <a:latin typeface="Cambria Math"/>
+                                  <a:ea typeface="Cambria Math"/>
+                                </a:rPr>
+                              </m:ctrlPr>
+                            </m:sSupPr>
+                            <m:e>
+                              <m:r>
+                                <a:rPr lang="de-DE" sz="3200" i="1">
+                                  <a:latin typeface="Cambria Math"/>
+                                  <a:ea typeface="Cambria Math"/>
+                                </a:rPr>
+                                <m:t>𝜃</m:t>
+                              </m:r>
+                            </m:e>
+                            <m:sup>
+                              <m:r>
+                                <a:rPr lang="de-DE" sz="3200" b="0" i="1" smtClean="0">
+                                  <a:latin typeface="Cambria Math"/>
+                                  <a:ea typeface="Cambria Math"/>
+                                </a:rPr>
+                                <m:t>(</m:t>
+                              </m:r>
+                              <m:r>
+                                <a:rPr lang="de-DE" sz="3200" b="0" i="1" smtClean="0">
+                                  <a:latin typeface="Cambria Math"/>
+                                  <a:ea typeface="Cambria Math"/>
+                                </a:rPr>
+                                <m:t>𝑡</m:t>
+                              </m:r>
+                              <m:r>
+                                <a:rPr lang="de-DE" sz="3200" b="0" i="1" smtClean="0">
+                                  <a:latin typeface="Cambria Math"/>
+                                  <a:ea typeface="Cambria Math"/>
+                                </a:rPr>
+                                <m:t>)</m:t>
+                              </m:r>
+                            </m:sup>
+                          </m:sSup>
+                        </m:e>
+                      </m:d>
+                      <m:r>
+                        <a:rPr lang="de-DE" sz="3200" b="0" i="1" smtClean="0">
+                          <a:latin typeface="Cambria Math"/>
+                          <a:ea typeface="Cambria Math"/>
+                        </a:rPr>
+                        <m:t>=</m:t>
+                      </m:r>
+                      <m:sSub>
+                        <m:sSubPr>
+                          <m:ctrlPr>
+                            <a:rPr lang="de-DE" sz="3200" b="0" i="1" smtClean="0">
+                              <a:latin typeface="Cambria Math"/>
+                              <a:ea typeface="Cambria Math"/>
+                            </a:rPr>
+                          </m:ctrlPr>
+                        </m:sSubPr>
+                        <m:e>
+                          <m:r>
+                            <a:rPr lang="de-DE" sz="3200" b="0" i="1" smtClean="0">
+                              <a:latin typeface="Cambria Math"/>
+                              <a:ea typeface="Cambria Math"/>
+                            </a:rPr>
+                            <m:t>𝐸</m:t>
+                          </m:r>
+                        </m:e>
+                        <m:sub>
+                          <m:sSub>
+                            <m:sSubPr>
+                              <m:ctrlPr>
+                                <a:rPr lang="de-DE" sz="3200" b="0" i="1" smtClean="0">
+                                  <a:latin typeface="Cambria Math"/>
+                                  <a:ea typeface="Cambria Math"/>
+                                </a:rPr>
+                              </m:ctrlPr>
+                            </m:sSubPr>
+                            <m:e>
+                              <m:r>
+                                <a:rPr lang="de-DE" sz="3200" b="0" i="1" smtClean="0">
+                                  <a:latin typeface="Cambria Math"/>
+                                  <a:ea typeface="Cambria Math"/>
+                                </a:rPr>
+                                <m:t>𝑌</m:t>
+                              </m:r>
+                            </m:e>
+                            <m:sub>
+                              <m:r>
+                                <a:rPr lang="de-DE" sz="3200" b="0" i="1" smtClean="0">
+                                  <a:latin typeface="Cambria Math"/>
+                                  <a:ea typeface="Cambria Math"/>
+                                </a:rPr>
+                                <m:t>𝑚𝑖𝑠</m:t>
+                              </m:r>
+                            </m:sub>
+                          </m:sSub>
+                          <m:r>
+                            <a:rPr lang="de-DE" sz="3200" b="0" i="1" smtClean="0">
+                              <a:latin typeface="Cambria Math"/>
+                              <a:ea typeface="Cambria Math"/>
+                            </a:rPr>
+                            <m:t>|</m:t>
+                          </m:r>
+                          <m:sSub>
+                            <m:sSubPr>
+                              <m:ctrlPr>
+                                <a:rPr lang="de-DE" sz="3200" b="0" i="1" smtClean="0">
+                                  <a:latin typeface="Cambria Math"/>
+                                  <a:ea typeface="Cambria Math"/>
+                                </a:rPr>
+                              </m:ctrlPr>
+                            </m:sSubPr>
+                            <m:e>
+                              <m:r>
+                                <a:rPr lang="de-DE" sz="3200" b="0" i="1" smtClean="0">
+                                  <a:latin typeface="Cambria Math"/>
+                                  <a:ea typeface="Cambria Math"/>
+                                </a:rPr>
+                                <m:t>𝑌</m:t>
+                              </m:r>
+                            </m:e>
+                            <m:sub>
+                              <m:r>
+                                <a:rPr lang="de-DE" sz="3200" b="0" i="1" smtClean="0">
+                                  <a:latin typeface="Cambria Math"/>
+                                  <a:ea typeface="Cambria Math"/>
+                                </a:rPr>
+                                <m:t>𝑜𝑏𝑠</m:t>
+                              </m:r>
+                            </m:sub>
+                          </m:sSub>
+                          <m:r>
+                            <a:rPr lang="de-DE" sz="3200" b="0" i="1" smtClean="0">
+                              <a:latin typeface="Cambria Math"/>
+                              <a:ea typeface="Cambria Math"/>
+                            </a:rPr>
+                            <m:t>,</m:t>
+                          </m:r>
+                          <m:sSup>
+                            <m:sSupPr>
+                              <m:ctrlPr>
+                                <a:rPr lang="de-DE" sz="3200" b="0" i="1" smtClean="0">
+                                  <a:latin typeface="Cambria Math"/>
+                                  <a:ea typeface="Cambria Math"/>
+                                </a:rPr>
+                              </m:ctrlPr>
+                            </m:sSupPr>
+                            <m:e>
+                              <m:r>
+                                <a:rPr lang="de-DE" sz="3200" i="1">
+                                  <a:latin typeface="Cambria Math"/>
+                                  <a:ea typeface="Cambria Math"/>
+                                </a:rPr>
+                                <m:t>𝜃</m:t>
+                              </m:r>
+                            </m:e>
+                            <m:sup>
+                              <m:r>
+                                <a:rPr lang="de-DE" sz="3200" b="0" i="1" smtClean="0">
+                                  <a:latin typeface="Cambria Math"/>
+                                  <a:ea typeface="Cambria Math"/>
+                                </a:rPr>
+                                <m:t>(</m:t>
+                              </m:r>
+                              <m:r>
+                                <a:rPr lang="de-DE" sz="3200" b="0" i="1" smtClean="0">
+                                  <a:latin typeface="Cambria Math"/>
+                                  <a:ea typeface="Cambria Math"/>
+                                </a:rPr>
+                                <m:t>𝑡</m:t>
+                              </m:r>
+                              <m:r>
+                                <a:rPr lang="de-DE" sz="3200" b="0" i="1" smtClean="0">
+                                  <a:latin typeface="Cambria Math"/>
+                                  <a:ea typeface="Cambria Math"/>
+                                </a:rPr>
+                                <m:t>)</m:t>
+                              </m:r>
+                            </m:sup>
+                          </m:sSup>
+                        </m:sub>
+                      </m:sSub>
+                      <m:r>
+                        <a:rPr lang="de-DE" sz="3200" b="0" i="1" smtClean="0">
+                          <a:latin typeface="Cambria Math"/>
+                          <a:ea typeface="Cambria Math"/>
+                        </a:rPr>
+                        <m:t>[</m:t>
+                      </m:r>
+                      <m:r>
+                        <a:rPr lang="de-DE" sz="3200" b="0" i="1" smtClean="0">
+                          <a:latin typeface="Cambria Math"/>
+                          <a:ea typeface="Cambria Math"/>
+                        </a:rPr>
+                        <m:t>𝑙𝑜𝑔𝐿</m:t>
+                      </m:r>
+                      <m:r>
+                        <a:rPr lang="de-DE" sz="3200" b="0" i="1" smtClean="0">
+                          <a:latin typeface="Cambria Math"/>
+                          <a:ea typeface="Cambria Math"/>
+                        </a:rPr>
+                        <m:t>(</m:t>
+                      </m:r>
+                      <m:r>
+                        <a:rPr lang="de-DE" sz="3200" i="1">
+                          <a:latin typeface="Cambria Math"/>
+                          <a:ea typeface="Cambria Math"/>
+                        </a:rPr>
+                        <m:t>𝜃</m:t>
+                      </m:r>
+                      <m:r>
+                        <a:rPr lang="de-DE" sz="3200" b="0" i="1" smtClean="0">
+                          <a:latin typeface="Cambria Math"/>
+                          <a:ea typeface="Cambria Math"/>
+                        </a:rPr>
+                        <m:t>;</m:t>
+                      </m:r>
+                      <m:sSub>
+                        <m:sSubPr>
+                          <m:ctrlPr>
+                            <a:rPr lang="de-DE" sz="3200" b="0" i="1" smtClean="0">
+                              <a:latin typeface="Cambria Math"/>
+                              <a:ea typeface="Cambria Math"/>
+                            </a:rPr>
+                          </m:ctrlPr>
+                        </m:sSubPr>
+                        <m:e>
+                          <m:r>
+                            <a:rPr lang="de-DE" sz="3200" b="0" i="1" smtClean="0">
+                              <a:latin typeface="Cambria Math"/>
+                              <a:ea typeface="Cambria Math"/>
+                            </a:rPr>
+                            <m:t>𝑌</m:t>
+                          </m:r>
+                        </m:e>
+                        <m:sub>
+                          <m:r>
+                            <a:rPr lang="de-DE" sz="3200" b="0" i="1" smtClean="0">
+                              <a:latin typeface="Cambria Math"/>
+                              <a:ea typeface="Cambria Math"/>
+                            </a:rPr>
+                            <m:t>𝑜𝑏𝑠</m:t>
+                          </m:r>
+                        </m:sub>
+                      </m:sSub>
+                      <m:r>
+                        <a:rPr lang="de-DE" sz="3200" b="0" i="1" smtClean="0">
+                          <a:latin typeface="Cambria Math"/>
+                          <a:ea typeface="Cambria Math"/>
+                        </a:rPr>
+                        <m:t>,</m:t>
+                      </m:r>
+                      <m:sSub>
+                        <m:sSubPr>
+                          <m:ctrlPr>
+                            <a:rPr lang="de-DE" sz="3200" b="0" i="1" smtClean="0">
+                              <a:latin typeface="Cambria Math"/>
+                              <a:ea typeface="Cambria Math"/>
+                            </a:rPr>
+                          </m:ctrlPr>
+                        </m:sSubPr>
+                        <m:e>
+                          <m:r>
+                            <a:rPr lang="de-DE" sz="3200" b="0" i="1" smtClean="0">
+                              <a:latin typeface="Cambria Math"/>
+                              <a:ea typeface="Cambria Math"/>
+                            </a:rPr>
+                            <m:t>𝑌</m:t>
+                          </m:r>
+                        </m:e>
+                        <m:sub>
+                          <m:r>
+                            <a:rPr lang="de-DE" sz="3200" b="0" i="1" smtClean="0">
+                              <a:latin typeface="Cambria Math"/>
+                              <a:ea typeface="Cambria Math"/>
+                            </a:rPr>
+                            <m:t>𝑚𝑖𝑠</m:t>
+                          </m:r>
+                        </m:sub>
+                      </m:sSub>
+                      <m:r>
+                        <a:rPr lang="de-DE" sz="3200" b="0" i="1" smtClean="0">
+                          <a:latin typeface="Cambria Math"/>
+                          <a:ea typeface="Cambria Math"/>
+                        </a:rPr>
+                        <m:t>)]</m:t>
+                      </m:r>
+                    </m:oMath>
+                  </m:oMathPara>
+                </a14:m>
+                <a:endParaRPr lang="en-GB" sz="3200" dirty="0" smtClean="0"/>
+              </a:p>
+              <a:p>
+                <a:pPr marL="285750" indent="-285750">
+                  <a:spcAft>
+                    <a:spcPts val="1200"/>
+                  </a:spcAft>
+                  <a:buFont typeface="Arial" pitchFamily="34" charset="0"/>
+                  <a:buChar char="•"/>
+                </a:pPr>
+                <a:r>
+                  <a:rPr lang="en-GB" sz="3200" dirty="0" smtClean="0"/>
+                  <a:t>M-step</a:t>
+                </a:r>
+                <a:r>
+                  <a:rPr lang="en-GB" sz="3200" dirty="0"/>
+                  <a:t> </a:t>
+                </a:r>
+                <a:r>
+                  <a:rPr lang="en-GB" sz="3200" dirty="0" smtClean="0"/>
+                  <a:t>updates the parameter vector </a:t>
+                </a:r>
+                <a14:m>
+                  <m:oMath xmlns:m="http://schemas.openxmlformats.org/officeDocument/2006/math">
+                    <m:r>
+                      <a:rPr lang="de-DE" sz="3200" i="1">
+                        <a:latin typeface="Cambria Math"/>
+                        <a:ea typeface="Cambria Math"/>
+                      </a:rPr>
+                      <m:t>𝜃</m:t>
+                    </m:r>
+                  </m:oMath>
+                </a14:m>
+                <a:r>
+                  <a:rPr lang="en-GB" sz="3200" dirty="0" smtClean="0"/>
+                  <a:t> by</a:t>
+                </a:r>
+              </a:p>
+              <a:p>
+                <a:pPr>
+                  <a:spcAft>
+                    <a:spcPts val="1200"/>
+                  </a:spcAft>
+                </a:pPr>
+                <a14:m>
+                  <m:oMathPara xmlns:m="http://schemas.openxmlformats.org/officeDocument/2006/math">
+                    <m:oMathParaPr>
+                      <m:jc m:val="centerGroup"/>
+                    </m:oMathParaPr>
+                    <m:oMath xmlns:m="http://schemas.openxmlformats.org/officeDocument/2006/math">
+                      <m:func>
+                        <m:funcPr>
+                          <m:ctrlPr>
+                            <a:rPr lang="de-DE" sz="3200" i="1">
+                              <a:latin typeface="Cambria Math"/>
+                            </a:rPr>
+                          </m:ctrlPr>
+                        </m:funcPr>
+                        <m:fName>
+                          <m:sSup>
+                            <m:sSupPr>
+                              <m:ctrlPr>
+                                <a:rPr lang="de-DE" sz="3200" i="1">
+                                  <a:latin typeface="Cambria Math"/>
+                                </a:rPr>
+                              </m:ctrlPr>
+                            </m:sSupPr>
+                            <m:e>
+                              <m:r>
+                                <a:rPr lang="de-DE" sz="3200" i="1">
+                                  <a:latin typeface="Cambria Math"/>
+                                  <a:ea typeface="Cambria Math"/>
+                                </a:rPr>
+                                <m:t>𝜃</m:t>
+                              </m:r>
+                            </m:e>
+                            <m:sup>
+                              <m:r>
+                                <a:rPr lang="de-DE" sz="3200" i="1">
+                                  <a:latin typeface="Cambria Math"/>
+                                </a:rPr>
+                                <m:t>(</m:t>
+                              </m:r>
+                              <m:r>
+                                <a:rPr lang="de-DE" sz="3200" i="1">
+                                  <a:latin typeface="Cambria Math"/>
+                                </a:rPr>
+                                <m:t>𝑡</m:t>
+                              </m:r>
+                              <m:r>
+                                <a:rPr lang="de-DE" sz="3200" i="1">
+                                  <a:latin typeface="Cambria Math"/>
+                                </a:rPr>
+                                <m:t>+1)</m:t>
+                              </m:r>
+                            </m:sup>
+                          </m:sSup>
+                          <m:r>
+                            <a:rPr lang="de-DE" sz="3200" i="1">
+                              <a:latin typeface="Cambria Math"/>
+                            </a:rPr>
+                            <m:t>=</m:t>
+                          </m:r>
+                        </m:fName>
+                        <m:e>
+                          <m:r>
+                            <a:rPr lang="de-DE" sz="3200" i="1">
+                              <a:latin typeface="Cambria Math"/>
+                            </a:rPr>
+                            <m:t>𝑄</m:t>
+                          </m:r>
+                          <m:d>
+                            <m:dPr>
+                              <m:ctrlPr>
+                                <a:rPr lang="de-DE" sz="3200" i="1">
+                                  <a:latin typeface="Cambria Math"/>
+                                </a:rPr>
+                              </m:ctrlPr>
+                            </m:dPr>
+                            <m:e>
+                              <m:r>
+                                <a:rPr lang="de-DE" sz="3200" i="1">
+                                  <a:latin typeface="Cambria Math"/>
+                                  <a:ea typeface="Cambria Math"/>
+                                </a:rPr>
+                                <m:t>𝜃</m:t>
+                              </m:r>
+                            </m:e>
+                            <m:e>
+                              <m:sSup>
+                                <m:sSupPr>
+                                  <m:ctrlPr>
+                                    <a:rPr lang="de-DE" sz="3200" i="1">
+                                      <a:latin typeface="Cambria Math"/>
+                                      <a:ea typeface="Cambria Math"/>
+                                    </a:rPr>
+                                  </m:ctrlPr>
+                                </m:sSupPr>
+                                <m:e>
+                                  <m:r>
+                                    <a:rPr lang="de-DE" sz="3200" i="1">
+                                      <a:latin typeface="Cambria Math"/>
+                                      <a:ea typeface="Cambria Math"/>
+                                    </a:rPr>
+                                    <m:t>𝜃</m:t>
+                                  </m:r>
+                                </m:e>
+                                <m:sup>
+                                  <m:r>
+                                    <a:rPr lang="de-DE" sz="3200" i="1">
+                                      <a:latin typeface="Cambria Math"/>
+                                      <a:ea typeface="Cambria Math"/>
+                                    </a:rPr>
+                                    <m:t>(</m:t>
+                                  </m:r>
+                                  <m:r>
+                                    <a:rPr lang="de-DE" sz="3200" i="1">
+                                      <a:latin typeface="Cambria Math"/>
+                                      <a:ea typeface="Cambria Math"/>
+                                    </a:rPr>
+                                    <m:t>𝑡</m:t>
+                                  </m:r>
+                                  <m:r>
+                                    <a:rPr lang="de-DE" sz="3200" i="1">
+                                      <a:latin typeface="Cambria Math"/>
+                                      <a:ea typeface="Cambria Math"/>
+                                    </a:rPr>
+                                    <m:t>)</m:t>
+                                  </m:r>
+                                </m:sup>
+                              </m:sSup>
+                            </m:e>
+                          </m:d>
+                        </m:e>
+                      </m:func>
+                    </m:oMath>
+                  </m:oMathPara>
+                </a14:m>
+                <a:endParaRPr lang="en-GB" sz="3200" dirty="0" smtClean="0"/>
+              </a:p>
+              <a:p>
+                <a:pPr marL="285750" indent="-285750">
+                  <a:spcAft>
+                    <a:spcPts val="1200"/>
+                  </a:spcAft>
+                  <a:buFont typeface="Arial" pitchFamily="34" charset="0"/>
+                  <a:buChar char="•"/>
+                </a:pPr>
+                <a:r>
+                  <a:rPr lang="en-GB" sz="3200" dirty="0" smtClean="0"/>
+                  <a:t>Iteration between E-step and M-step until stopping criterion is met</a:t>
+                </a:r>
+              </a:p>
+              <a:p>
+                <a:pPr marL="285750" indent="-285750">
+                  <a:spcAft>
+                    <a:spcPts val="1200"/>
+                  </a:spcAft>
+                  <a:buFont typeface="Arial" pitchFamily="34" charset="0"/>
+                  <a:buChar char="•"/>
+                </a:pPr>
+                <a:r>
+                  <a:rPr lang="en-GB" sz="3200" dirty="0" smtClean="0"/>
+                  <a:t>ADVANTAGES EVTL. NOCH AUFLISTEN</a:t>
+                </a:r>
+              </a:p>
+              <a:p>
+                <a:pPr marL="285750" indent="-285750">
+                  <a:spcAft>
+                    <a:spcPts val="1200"/>
+                  </a:spcAft>
+                  <a:buFont typeface="Arial" pitchFamily="34" charset="0"/>
+                  <a:buChar char="•"/>
+                </a:pPr>
+                <a:endParaRPr lang="en-GB" sz="3200" dirty="0" smtClean="0"/>
+              </a:p>
+              <a:p>
+                <a:pPr marL="285750" indent="-285750">
+                  <a:spcAft>
+                    <a:spcPts val="1200"/>
+                  </a:spcAft>
+                  <a:buFont typeface="Arial" pitchFamily="34" charset="0"/>
+                  <a:buChar char="•"/>
+                </a:pPr>
+                <a:endParaRPr lang="en-GB" sz="2800" dirty="0"/>
+              </a:p>
+            </p:txBody>
+          </p:sp>
+        </mc:Choice>
+        <mc:Fallback>
+          <p:sp>
+            <p:nvSpPr>
+              <p:cNvPr id="91" name="Textfeld 90"/>
+              <p:cNvSpPr txBox="1">
+                <a:spLocks noRot="1" noChangeAspect="1" noMove="1" noResize="1" noEditPoints="1" noAdjustHandles="1" noChangeArrowheads="1" noChangeShapeType="1" noTextEdit="1"/>
+              </p:cNvSpPr>
+              <p:nvPr/>
+            </p:nvSpPr>
+            <p:spPr>
+              <a:xfrm>
+                <a:off x="1233714" y="16202198"/>
+                <a:ext cx="9344944" cy="9150197"/>
+              </a:xfrm>
+              <a:prstGeom prst="rect">
+                <a:avLst/>
+              </a:prstGeom>
+              <a:blipFill rotWithShape="1">
+                <a:blip r:embed="rId4"/>
+                <a:stretch>
+                  <a:fillRect l="-1435" t="-866"/>
+                </a:stretch>
+              </a:blipFill>
+            </p:spPr>
+            <p:txBody>
+              <a:bodyPr/>
+              <a:lstStyle/>
+              <a:p>
+                <a:r>
+                  <a:rPr lang="de-DE">
+                    <a:noFill/>
+                  </a:rPr>
+                  <a:t> </a:t>
+                </a:r>
+              </a:p>
+            </p:txBody>
+          </p:sp>
+        </mc:Fallback>
+      </mc:AlternateContent>
+      <p:sp>
+        <p:nvSpPr>
+          <p:cNvPr id="93" name="Rechteck 92"/>
+          <p:cNvSpPr/>
+          <p:nvPr/>
+        </p:nvSpPr>
+        <p:spPr>
+          <a:xfrm>
+            <a:off x="11532520" y="5815536"/>
+            <a:ext cx="9344943" cy="8865664"/>
+          </a:xfrm>
+          <a:prstGeom prst="rect">
+            <a:avLst/>
+          </a:prstGeom>
+          <a:noFill/>
+          <a:ln w="76200" cmpd="sng">
+            <a:solidFill>
+              <a:srgbClr val="4F81BD"/>
+            </a:solidFill>
+          </a:ln>
+          <a:effectLst/>
+        </p:spPr>
+        <p:style>
+          <a:lnRef idx="1">
+            <a:schemeClr val="accent1"/>
+          </a:lnRef>
+          <a:fillRef idx="3">
+            <a:schemeClr val="accent1"/>
+          </a:fillRef>
+          <a:effectRef idx="2">
+            <a:schemeClr val="accent1"/>
+          </a:effectRef>
+          <a:fontRef idx="minor">
+            <a:schemeClr val="lt1"/>
+          </a:fontRef>
+        </p:style>
+        <p:txBody>
+          <a:bodyPr rtlCol="0" anchor="ctr"/>
+          <a:lstStyle/>
+          <a:p>
+            <a:pPr algn="just"/>
+            <a:endParaRPr lang="en-US" sz="1273" dirty="0">
+              <a:latin typeface="Arial" panose="020B0604020202020204" pitchFamily="34" charset="0"/>
+              <a:cs typeface="Arial" panose="020B0604020202020204" pitchFamily="34" charset="0"/>
             </a:endParaRPr>
+          </a:p>
+        </p:txBody>
+      </p:sp>
+      <p:sp>
+        <p:nvSpPr>
+          <p:cNvPr id="95" name="Rechteck 94"/>
+          <p:cNvSpPr/>
+          <p:nvPr/>
+        </p:nvSpPr>
+        <p:spPr>
+          <a:xfrm>
+            <a:off x="32178497" y="5215458"/>
+            <a:ext cx="9344943" cy="14596542"/>
+          </a:xfrm>
+          <a:prstGeom prst="rect">
+            <a:avLst/>
+          </a:prstGeom>
+          <a:noFill/>
+          <a:ln w="76200" cmpd="sng">
+            <a:solidFill>
+              <a:srgbClr val="4F81BD"/>
+            </a:solidFill>
+          </a:ln>
+          <a:effectLst/>
+        </p:spPr>
+        <p:style>
+          <a:lnRef idx="1">
+            <a:schemeClr val="accent1"/>
+          </a:lnRef>
+          <a:fillRef idx="3">
+            <a:schemeClr val="accent1"/>
+          </a:fillRef>
+          <a:effectRef idx="2">
+            <a:schemeClr val="accent1"/>
+          </a:effectRef>
+          <a:fontRef idx="minor">
+            <a:schemeClr val="lt1"/>
+          </a:fontRef>
+        </p:style>
+        <p:txBody>
+          <a:bodyPr rtlCol="0" anchor="ctr"/>
+          <a:lstStyle/>
+          <a:p>
+            <a:pPr algn="just"/>
+            <a:endParaRPr lang="en-US" sz="1273" dirty="0">
+              <a:latin typeface="Arial" panose="020B0604020202020204" pitchFamily="34" charset="0"/>
+              <a:cs typeface="Arial" panose="020B0604020202020204" pitchFamily="34" charset="0"/>
+            </a:endParaRPr>
+          </a:p>
+        </p:txBody>
+      </p:sp>
+      <p:sp>
+        <p:nvSpPr>
+          <p:cNvPr id="97" name="Rechteck 96"/>
+          <p:cNvSpPr/>
+          <p:nvPr/>
+        </p:nvSpPr>
+        <p:spPr>
+          <a:xfrm>
+            <a:off x="21849227" y="5815531"/>
+            <a:ext cx="9344943" cy="19536863"/>
+          </a:xfrm>
+          <a:prstGeom prst="rect">
+            <a:avLst/>
+          </a:prstGeom>
+          <a:noFill/>
+          <a:ln w="76200" cmpd="sng">
+            <a:solidFill>
+              <a:srgbClr val="4F81BD"/>
+            </a:solidFill>
+          </a:ln>
+          <a:effectLst/>
+        </p:spPr>
+        <p:style>
+          <a:lnRef idx="1">
+            <a:schemeClr val="accent1"/>
+          </a:lnRef>
+          <a:fillRef idx="3">
+            <a:schemeClr val="accent1"/>
+          </a:fillRef>
+          <a:effectRef idx="2">
+            <a:schemeClr val="accent1"/>
+          </a:effectRef>
+          <a:fontRef idx="minor">
+            <a:schemeClr val="lt1"/>
+          </a:fontRef>
+        </p:style>
+        <p:txBody>
+          <a:bodyPr rtlCol="0" anchor="ctr"/>
+          <a:lstStyle/>
+          <a:p>
+            <a:pPr algn="just"/>
+            <a:endParaRPr lang="en-US" sz="1273" dirty="0">
+              <a:latin typeface="Arial" panose="020B0604020202020204" pitchFamily="34" charset="0"/>
+              <a:cs typeface="Arial" panose="020B0604020202020204" pitchFamily="34" charset="0"/>
+            </a:endParaRPr>
+          </a:p>
+        </p:txBody>
+      </p:sp>
+      <p:sp>
+        <p:nvSpPr>
+          <p:cNvPr id="100" name="Textfeld 99"/>
+          <p:cNvSpPr txBox="1"/>
+          <p:nvPr/>
+        </p:nvSpPr>
+        <p:spPr>
+          <a:xfrm>
+            <a:off x="11532519" y="5908821"/>
+            <a:ext cx="8959430" cy="636649"/>
+          </a:xfrm>
+          <a:prstGeom prst="rect">
+            <a:avLst/>
+          </a:prstGeom>
+          <a:noFill/>
+          <a:ln w="12700" cmpd="sng">
+            <a:noFill/>
+          </a:ln>
+        </p:spPr>
+        <p:txBody>
+          <a:bodyPr wrap="square" rtlCol="0">
+            <a:spAutoFit/>
+          </a:bodyPr>
+          <a:lstStyle/>
+          <a:p>
+            <a:pPr algn="just"/>
+            <a:r>
+              <a:rPr lang="en-US" sz="3537" b="1" dirty="0" smtClean="0">
+                <a:solidFill>
+                  <a:srgbClr val="DCE6F2"/>
+                </a:solidFill>
+                <a:latin typeface="Arial" panose="020B0604020202020204" pitchFamily="34" charset="0"/>
+                <a:cs typeface="Arial" panose="020B0604020202020204" pitchFamily="34" charset="0"/>
+              </a:rPr>
+              <a:t>3. Supplemented EM algorithm</a:t>
+            </a:r>
+            <a:endParaRPr lang="en-US" sz="2829" dirty="0">
+              <a:solidFill>
+                <a:srgbClr val="000000"/>
+              </a:solidFill>
+              <a:latin typeface="Arial" panose="020B0604020202020204" pitchFamily="34" charset="0"/>
+              <a:cs typeface="Arial" panose="020B0604020202020204" pitchFamily="34" charset="0"/>
+            </a:endParaRPr>
+          </a:p>
+        </p:txBody>
+      </p:sp>
+      <p:sp>
+        <p:nvSpPr>
+          <p:cNvPr id="102" name="Textfeld 101"/>
+          <p:cNvSpPr txBox="1"/>
+          <p:nvPr/>
+        </p:nvSpPr>
+        <p:spPr>
+          <a:xfrm>
+            <a:off x="21876104" y="5908821"/>
+            <a:ext cx="8959430" cy="636648"/>
+          </a:xfrm>
+          <a:prstGeom prst="rect">
+            <a:avLst/>
+          </a:prstGeom>
+          <a:noFill/>
+          <a:ln w="12700" cmpd="sng">
+            <a:noFill/>
+          </a:ln>
+        </p:spPr>
+        <p:txBody>
+          <a:bodyPr wrap="square" rtlCol="0">
+            <a:spAutoFit/>
+          </a:bodyPr>
+          <a:lstStyle/>
+          <a:p>
+            <a:pPr algn="just"/>
+            <a:r>
+              <a:rPr lang="en-US" sz="3537" b="1" dirty="0" smtClean="0">
+                <a:solidFill>
+                  <a:srgbClr val="DCE6F2"/>
+                </a:solidFill>
+                <a:latin typeface="Arial" panose="020B0604020202020204" pitchFamily="34" charset="0"/>
+                <a:cs typeface="Arial" panose="020B0604020202020204" pitchFamily="34" charset="0"/>
+              </a:rPr>
+              <a:t>5. Results</a:t>
+            </a:r>
+            <a:endParaRPr lang="en-US" sz="2829" dirty="0">
+              <a:solidFill>
+                <a:srgbClr val="000000"/>
+              </a:solidFill>
+              <a:latin typeface="Arial" panose="020B0604020202020204" pitchFamily="34" charset="0"/>
+              <a:cs typeface="Arial" panose="020B0604020202020204" pitchFamily="34" charset="0"/>
+            </a:endParaRPr>
+          </a:p>
+        </p:txBody>
+      </p:sp>
+      <p:sp>
+        <p:nvSpPr>
+          <p:cNvPr id="104" name="Textfeld 103"/>
+          <p:cNvSpPr txBox="1"/>
+          <p:nvPr/>
+        </p:nvSpPr>
+        <p:spPr>
+          <a:xfrm>
+            <a:off x="32178494" y="5908821"/>
+            <a:ext cx="8959430" cy="636648"/>
+          </a:xfrm>
+          <a:prstGeom prst="rect">
+            <a:avLst/>
+          </a:prstGeom>
+          <a:noFill/>
+          <a:ln w="12700" cmpd="sng">
+            <a:noFill/>
+          </a:ln>
+        </p:spPr>
+        <p:txBody>
+          <a:bodyPr wrap="square" rtlCol="0">
+            <a:spAutoFit/>
+          </a:bodyPr>
+          <a:lstStyle/>
+          <a:p>
+            <a:pPr algn="just"/>
+            <a:r>
+              <a:rPr lang="en-US" sz="3537" b="1" dirty="0" smtClean="0">
+                <a:solidFill>
+                  <a:srgbClr val="DCE6F2"/>
+                </a:solidFill>
+                <a:latin typeface="Arial" panose="020B0604020202020204" pitchFamily="34" charset="0"/>
+                <a:cs typeface="Arial" panose="020B0604020202020204" pitchFamily="34" charset="0"/>
+              </a:rPr>
+              <a:t>6. Discussion</a:t>
+            </a:r>
+            <a:endParaRPr lang="en-US" sz="2829" dirty="0">
+              <a:solidFill>
+                <a:srgbClr val="000000"/>
+              </a:solidFill>
+              <a:latin typeface="Arial" panose="020B0604020202020204" pitchFamily="34" charset="0"/>
+              <a:cs typeface="Arial" panose="020B0604020202020204" pitchFamily="34" charset="0"/>
+            </a:endParaRPr>
+          </a:p>
+        </p:txBody>
+      </p:sp>
+      <mc:AlternateContent xmlns:mc="http://schemas.openxmlformats.org/markup-compatibility/2006">
+        <mc:Choice xmlns:a14="http://schemas.microsoft.com/office/drawing/2010/main" Requires="a14">
+          <p:sp>
+            <p:nvSpPr>
+              <p:cNvPr id="105" name="Textfeld 104"/>
+              <p:cNvSpPr txBox="1"/>
+              <p:nvPr/>
+            </p:nvSpPr>
+            <p:spPr>
+              <a:xfrm>
+                <a:off x="11596727" y="6697869"/>
+                <a:ext cx="9344942" cy="8181535"/>
+              </a:xfrm>
+              <a:prstGeom prst="rect">
+                <a:avLst/>
+              </a:prstGeom>
+              <a:noFill/>
+            </p:spPr>
+            <p:txBody>
+              <a:bodyPr wrap="square" rtlCol="0">
+                <a:spAutoFit/>
+              </a:bodyPr>
+              <a:lstStyle/>
+              <a:p>
+                <a:pPr marL="285750" indent="-285750">
+                  <a:spcAft>
+                    <a:spcPts val="1200"/>
+                  </a:spcAft>
+                  <a:buFont typeface="Arial" pitchFamily="34" charset="0"/>
+                  <a:buChar char="•"/>
+                </a:pPr>
+                <a:r>
+                  <a:rPr lang="en-GB" sz="3200" dirty="0" smtClean="0"/>
+                  <a:t>Calculates numerically stable asymptotic variance-covariance matrix for parameters estimated by EM</a:t>
+                </a:r>
+              </a:p>
+              <a:p>
+                <a:pPr marL="285750" indent="-285750">
+                  <a:spcAft>
+                    <a:spcPts val="1200"/>
+                  </a:spcAft>
+                  <a:buFont typeface="Arial" pitchFamily="34" charset="0"/>
+                  <a:buChar char="•"/>
+                </a:pPr>
+                <a:r>
+                  <a:rPr lang="en-GB" sz="3200" dirty="0" smtClean="0"/>
+                  <a:t>Calculation of this matrix V is done in three steps</a:t>
+                </a:r>
+              </a:p>
+              <a:p>
+                <a:pPr marL="285750" indent="-285750">
+                  <a:spcAft>
+                    <a:spcPts val="1200"/>
+                  </a:spcAft>
+                  <a:buFont typeface="Arial" pitchFamily="34" charset="0"/>
+                  <a:buChar char="•"/>
+                </a:pPr>
+                <a:r>
+                  <a:rPr lang="en-GB" sz="3200" dirty="0" smtClean="0"/>
+                  <a:t>Step 1: Evaluation of adjusted information matrix </a:t>
+                </a:r>
+                <a14:m>
+                  <m:oMath xmlns:m="http://schemas.openxmlformats.org/officeDocument/2006/math">
+                    <m:sSub>
+                      <m:sSubPr>
+                        <m:ctrlPr>
+                          <a:rPr lang="en-GB" sz="3200" i="1" smtClean="0">
+                            <a:latin typeface="Cambria Math"/>
+                          </a:rPr>
+                        </m:ctrlPr>
+                      </m:sSubPr>
+                      <m:e>
+                        <m:r>
+                          <a:rPr lang="de-DE" sz="3200" b="0" i="1" smtClean="0">
+                            <a:latin typeface="Cambria Math"/>
+                          </a:rPr>
+                          <m:t>𝐼</m:t>
+                        </m:r>
+                      </m:e>
+                      <m:sub>
+                        <m:r>
+                          <a:rPr lang="de-DE" sz="3200" b="0" i="1" smtClean="0">
+                            <a:latin typeface="Cambria Math"/>
+                          </a:rPr>
+                          <m:t>𝑜𝑐</m:t>
+                        </m:r>
+                      </m:sub>
+                    </m:sSub>
+                  </m:oMath>
+                </a14:m>
+                <a:r>
+                  <a:rPr lang="en-GB" sz="3200" dirty="0" smtClean="0"/>
+                  <a:t>, which is obtained from the complete-data observed information matrix by</a:t>
+                </a:r>
+              </a:p>
+              <a:p>
+                <a:pPr algn="ctr">
+                  <a:spcAft>
+                    <a:spcPts val="1200"/>
+                  </a:spcAft>
+                </a:pPr>
+                <a:r>
+                  <a:rPr lang="en-GB" sz="3200" dirty="0" smtClean="0"/>
+                  <a:t> </a:t>
+                </a:r>
+                <a14:m>
+                  <m:oMath xmlns:m="http://schemas.openxmlformats.org/officeDocument/2006/math">
+                    <m:sSub>
+                      <m:sSubPr>
+                        <m:ctrlPr>
+                          <a:rPr lang="en-GB" sz="3200" i="1" dirty="0" smtClean="0">
+                            <a:latin typeface="Cambria Math"/>
+                          </a:rPr>
+                        </m:ctrlPr>
+                      </m:sSubPr>
+                      <m:e>
+                        <m:r>
+                          <a:rPr lang="de-DE" sz="3200" b="0" i="1" dirty="0" smtClean="0">
+                            <a:latin typeface="Cambria Math"/>
+                          </a:rPr>
+                          <m:t>𝐼</m:t>
+                        </m:r>
+                      </m:e>
+                      <m:sub>
+                        <m:r>
+                          <a:rPr lang="de-DE" sz="3200" b="0" i="1" dirty="0" smtClean="0">
+                            <a:latin typeface="Cambria Math"/>
+                          </a:rPr>
+                          <m:t>𝑜𝑐</m:t>
+                        </m:r>
+                      </m:sub>
+                    </m:sSub>
+                    <m:r>
+                      <a:rPr lang="en-GB" sz="3200" i="1" dirty="0">
+                        <a:latin typeface="Cambria Math"/>
+                      </a:rPr>
+                      <m:t>= </m:t>
+                    </m:r>
+                    <m:sSub>
+                      <m:sSubPr>
+                        <m:ctrlPr>
+                          <a:rPr lang="en-GB" sz="3200" i="1" dirty="0" smtClean="0">
+                            <a:latin typeface="Cambria Math"/>
+                          </a:rPr>
+                        </m:ctrlPr>
+                      </m:sSubPr>
+                      <m:e>
+                        <m:r>
+                          <a:rPr lang="de-DE" sz="3200" b="0" i="1" dirty="0" smtClean="0">
+                            <a:latin typeface="Cambria Math"/>
+                          </a:rPr>
+                          <m:t>𝐼</m:t>
+                        </m:r>
+                      </m:e>
+                      <m:sub>
+                        <m:r>
+                          <a:rPr lang="de-DE" sz="3200" b="0" i="1" dirty="0" smtClean="0">
+                            <a:latin typeface="Cambria Math"/>
+                          </a:rPr>
+                          <m:t>𝑜</m:t>
+                        </m:r>
+                      </m:sub>
+                    </m:sSub>
+                    <m:d>
+                      <m:dPr>
+                        <m:ctrlPr>
+                          <a:rPr lang="en-GB" sz="3200" i="1" dirty="0" smtClean="0">
+                            <a:latin typeface="Cambria Math"/>
+                          </a:rPr>
+                        </m:ctrlPr>
+                      </m:dPr>
+                      <m:e>
+                        <m:sSup>
+                          <m:sSupPr>
+                            <m:ctrlPr>
+                              <a:rPr lang="el-GR" sz="3200" i="1" dirty="0" smtClean="0">
+                                <a:latin typeface="Cambria Math"/>
+                                <a:ea typeface="Cambria Math"/>
+                              </a:rPr>
+                            </m:ctrlPr>
+                          </m:sSupPr>
+                          <m:e>
+                            <m:r>
+                              <a:rPr lang="el-GR" sz="3200" i="1" dirty="0">
+                                <a:latin typeface="Cambria Math"/>
+                                <a:ea typeface="Cambria Math"/>
+                              </a:rPr>
+                              <m:t>𝜃</m:t>
+                            </m:r>
+                          </m:e>
+                          <m:sup>
+                            <m:r>
+                              <a:rPr lang="de-DE" sz="3200" b="0" i="1" dirty="0" smtClean="0">
+                                <a:latin typeface="Cambria Math"/>
+                                <a:ea typeface="Cambria Math"/>
+                              </a:rPr>
+                              <m:t>∗</m:t>
+                            </m:r>
+                          </m:sup>
+                        </m:sSup>
+                      </m:e>
+                      <m:e>
+                        <m:sSup>
+                          <m:sSupPr>
+                            <m:ctrlPr>
+                              <a:rPr lang="el-GR" sz="3200" i="1" dirty="0" smtClean="0">
+                                <a:latin typeface="Cambria Math"/>
+                              </a:rPr>
+                            </m:ctrlPr>
+                          </m:sSupPr>
+                          <m:e>
+                            <m:r>
+                              <a:rPr lang="de-DE" sz="3200" b="0" i="1" dirty="0" smtClean="0">
+                                <a:latin typeface="Cambria Math"/>
+                              </a:rPr>
+                              <m:t>𝑆</m:t>
+                            </m:r>
+                          </m:e>
+                          <m:sup>
+                            <m:r>
+                              <a:rPr lang="de-DE" sz="3200" b="0" i="1" dirty="0" smtClean="0">
+                                <a:latin typeface="Cambria Math"/>
+                              </a:rPr>
+                              <m:t>∗</m:t>
+                            </m:r>
+                          </m:sup>
+                        </m:sSup>
+                        <m:d>
+                          <m:dPr>
+                            <m:ctrlPr>
+                              <a:rPr lang="en-GB" sz="3200" i="1" dirty="0" smtClean="0">
+                                <a:latin typeface="Cambria Math"/>
+                              </a:rPr>
+                            </m:ctrlPr>
+                          </m:dPr>
+                          <m:e>
+                            <m:sSub>
+                              <m:sSubPr>
+                                <m:ctrlPr>
+                                  <a:rPr lang="en-GB" sz="3200" i="1" dirty="0" smtClean="0">
+                                    <a:latin typeface="Cambria Math"/>
+                                  </a:rPr>
+                                </m:ctrlPr>
+                              </m:sSubPr>
+                              <m:e>
+                                <m:r>
+                                  <a:rPr lang="de-DE" sz="3200" b="0" i="1" dirty="0" smtClean="0">
+                                    <a:latin typeface="Cambria Math"/>
+                                  </a:rPr>
+                                  <m:t>𝑌</m:t>
+                                </m:r>
+                              </m:e>
+                              <m:sub>
+                                <m:r>
+                                  <a:rPr lang="de-DE" sz="3200" b="0" i="1" dirty="0" smtClean="0">
+                                    <a:latin typeface="Cambria Math"/>
+                                  </a:rPr>
+                                  <m:t>𝑜𝑏𝑠</m:t>
+                                </m:r>
+                              </m:sub>
+                            </m:sSub>
+                          </m:e>
+                        </m:d>
+                      </m:e>
+                    </m:d>
+                    <m:r>
+                      <a:rPr lang="de-DE" sz="3200" b="0" i="1" dirty="0" smtClean="0">
+                        <a:latin typeface="Cambria Math"/>
+                      </a:rPr>
+                      <m:t>,</m:t>
+                    </m:r>
+                    <m:r>
+                      <a:rPr lang="de-DE" sz="3200" i="1" dirty="0">
+                        <a:latin typeface="Cambria Math"/>
+                      </a:rPr>
+                      <m:t>𝑤h𝑒𝑟𝑒</m:t>
+                    </m:r>
+                    <m:r>
+                      <a:rPr lang="de-DE" sz="3200" b="0" i="1" dirty="0" smtClean="0">
+                        <a:latin typeface="Cambria Math"/>
+                      </a:rPr>
+                      <m:t> </m:t>
+                    </m:r>
+                    <m:sSup>
+                      <m:sSupPr>
+                        <m:ctrlPr>
+                          <a:rPr lang="de-DE" sz="3200" b="0" i="1" dirty="0" smtClean="0">
+                            <a:latin typeface="Cambria Math"/>
+                          </a:rPr>
+                        </m:ctrlPr>
+                      </m:sSupPr>
+                      <m:e>
+                        <m:r>
+                          <a:rPr lang="de-DE" sz="3200" b="0" i="1" dirty="0" smtClean="0">
+                            <a:latin typeface="Cambria Math"/>
+                          </a:rPr>
+                          <m:t>𝑆</m:t>
+                        </m:r>
+                      </m:e>
+                      <m:sup>
+                        <m:r>
+                          <a:rPr lang="de-DE" sz="3200" b="0" i="1" dirty="0" smtClean="0">
+                            <a:latin typeface="Cambria Math"/>
+                          </a:rPr>
+                          <m:t>∗</m:t>
+                        </m:r>
+                      </m:sup>
+                    </m:sSup>
+                    <m:r>
+                      <a:rPr lang="de-DE" sz="3200" b="0" i="1" dirty="0" smtClean="0">
+                        <a:latin typeface="Cambria Math"/>
+                      </a:rPr>
+                      <m:t>=</m:t>
+                    </m:r>
+                    <m:r>
+                      <a:rPr lang="de-DE" sz="3200" b="0" i="1" dirty="0" smtClean="0">
+                        <a:latin typeface="Cambria Math"/>
+                      </a:rPr>
+                      <m:t>𝐸</m:t>
+                    </m:r>
+                    <m:d>
+                      <m:dPr>
+                        <m:begChr m:val="["/>
+                        <m:endChr m:val="]"/>
+                        <m:ctrlPr>
+                          <a:rPr lang="de-DE" sz="3200" b="0" i="1" dirty="0" smtClean="0">
+                            <a:latin typeface="Cambria Math"/>
+                          </a:rPr>
+                        </m:ctrlPr>
+                      </m:dPr>
+                      <m:e>
+                        <m:r>
+                          <a:rPr lang="de-DE" sz="3200" b="0" i="1" dirty="0" smtClean="0">
+                            <a:latin typeface="Cambria Math"/>
+                          </a:rPr>
+                          <m:t>𝑆</m:t>
+                        </m:r>
+                        <m:d>
+                          <m:dPr>
+                            <m:ctrlPr>
+                              <a:rPr lang="de-DE" sz="3200" b="0" i="1" dirty="0" smtClean="0">
+                                <a:latin typeface="Cambria Math"/>
+                              </a:rPr>
+                            </m:ctrlPr>
+                          </m:dPr>
+                          <m:e>
+                            <m:r>
+                              <a:rPr lang="de-DE" sz="3200" b="0" i="1" dirty="0" smtClean="0">
+                                <a:latin typeface="Cambria Math"/>
+                              </a:rPr>
+                              <m:t>𝑌</m:t>
+                            </m:r>
+                          </m:e>
+                        </m:d>
+                        <m:r>
+                          <a:rPr lang="de-DE" sz="3200" b="0" i="1" dirty="0" smtClean="0">
+                            <a:latin typeface="Cambria Math"/>
+                          </a:rPr>
+                          <m:t>|</m:t>
+                        </m:r>
+                        <m:sSub>
+                          <m:sSubPr>
+                            <m:ctrlPr>
+                              <a:rPr lang="de-DE" sz="3200" b="0" i="1" dirty="0" smtClean="0">
+                                <a:latin typeface="Cambria Math"/>
+                              </a:rPr>
+                            </m:ctrlPr>
+                          </m:sSubPr>
+                          <m:e>
+                            <m:r>
+                              <a:rPr lang="de-DE" sz="3200" b="0" i="1" dirty="0" smtClean="0">
+                                <a:latin typeface="Cambria Math"/>
+                              </a:rPr>
+                              <m:t>𝑌</m:t>
+                            </m:r>
+                          </m:e>
+                          <m:sub>
+                            <m:r>
+                              <a:rPr lang="de-DE" sz="3200" b="0" i="1" dirty="0" smtClean="0">
+                                <a:latin typeface="Cambria Math"/>
+                              </a:rPr>
+                              <m:t>𝑜𝑏𝑠</m:t>
+                            </m:r>
+                          </m:sub>
+                        </m:sSub>
+                        <m:r>
+                          <a:rPr lang="de-DE" sz="3200" b="0" i="1" dirty="0" smtClean="0">
+                            <a:latin typeface="Cambria Math"/>
+                          </a:rPr>
+                          <m:t>,</m:t>
+                        </m:r>
+                        <m:r>
+                          <a:rPr lang="el-GR" sz="3200" i="1" dirty="0" smtClean="0">
+                            <a:latin typeface="Cambria Math"/>
+                            <a:ea typeface="Cambria Math"/>
+                          </a:rPr>
+                          <m:t>𝜃</m:t>
+                        </m:r>
+                      </m:e>
+                    </m:d>
+                  </m:oMath>
+                </a14:m>
+                <a:endParaRPr lang="en-GB" sz="3200" dirty="0" smtClean="0"/>
+              </a:p>
+              <a:p>
+                <a:pPr marL="285750" indent="-285750">
+                  <a:spcAft>
+                    <a:spcPts val="1200"/>
+                  </a:spcAft>
+                  <a:buFont typeface="Arial" pitchFamily="34" charset="0"/>
+                  <a:buChar char="•"/>
+                </a:pPr>
+                <a:r>
+                  <a:rPr lang="en-GB" sz="3200" dirty="0" smtClean="0"/>
+                  <a:t>Step 2: Calculation of elements in rate-of-convergence matrix DM by</a:t>
+                </a:r>
+              </a:p>
+              <a:p>
+                <a:pPr algn="ctr">
+                  <a:spcAft>
+                    <a:spcPts val="1200"/>
+                  </a:spcAft>
+                </a:pPr>
+                <a14:m>
+                  <m:oMath xmlns:m="http://schemas.openxmlformats.org/officeDocument/2006/math">
+                    <m:sSub>
+                      <m:sSubPr>
+                        <m:ctrlPr>
+                          <a:rPr lang="en-GB" sz="3200" i="1" smtClean="0">
+                            <a:latin typeface="Cambria Math"/>
+                          </a:rPr>
+                        </m:ctrlPr>
+                      </m:sSubPr>
+                      <m:e>
+                        <m:r>
+                          <a:rPr lang="de-DE" sz="3200" b="0" i="1" smtClean="0">
+                            <a:latin typeface="Cambria Math"/>
+                          </a:rPr>
+                          <m:t>𝑟</m:t>
+                        </m:r>
+                      </m:e>
+                      <m:sub>
+                        <m:r>
+                          <a:rPr lang="de-DE" sz="3200" b="0" i="1" smtClean="0">
+                            <a:latin typeface="Cambria Math"/>
+                          </a:rPr>
+                          <m:t>𝑖𝑗</m:t>
+                        </m:r>
+                      </m:sub>
+                    </m:sSub>
+                    <m:r>
+                      <a:rPr lang="de-DE" sz="3200" b="0" i="1" smtClean="0">
+                        <a:latin typeface="Cambria Math"/>
+                      </a:rPr>
+                      <m:t>=</m:t>
+                    </m:r>
+                    <m:func>
+                      <m:funcPr>
+                        <m:ctrlPr>
+                          <a:rPr lang="de-DE" sz="3200" b="0" i="1" smtClean="0">
+                            <a:latin typeface="Cambria Math"/>
+                          </a:rPr>
+                        </m:ctrlPr>
+                      </m:funcPr>
+                      <m:fName>
+                        <m:limLow>
+                          <m:limLowPr>
+                            <m:ctrlPr>
+                              <a:rPr lang="de-DE" sz="3200" b="0" i="1" smtClean="0">
+                                <a:latin typeface="Cambria Math"/>
+                              </a:rPr>
+                            </m:ctrlPr>
+                          </m:limLowPr>
+                          <m:e>
+                            <m:r>
+                              <m:rPr>
+                                <m:sty m:val="p"/>
+                              </m:rPr>
+                              <a:rPr lang="de-DE" sz="3200" b="0" i="0" smtClean="0">
+                                <a:latin typeface="Cambria Math"/>
+                              </a:rPr>
+                              <m:t>lim</m:t>
+                            </m:r>
+                          </m:e>
+                          <m:lim>
+                            <m:r>
+                              <a:rPr lang="de-DE" sz="3200" b="0" i="1" smtClean="0">
+                                <a:latin typeface="Cambria Math"/>
+                              </a:rPr>
+                              <m:t>𝑡</m:t>
+                            </m:r>
+                            <m:r>
+                              <a:rPr lang="de-DE" sz="3200" b="0" i="1" smtClean="0">
+                                <a:latin typeface="Cambria Math"/>
+                                <a:ea typeface="Cambria Math"/>
+                              </a:rPr>
+                              <m:t>→∞</m:t>
+                            </m:r>
+                          </m:lim>
+                        </m:limLow>
+                      </m:fName>
+                      <m:e>
+                        <m:sSub>
+                          <m:sSubPr>
+                            <m:ctrlPr>
+                              <a:rPr lang="de-DE" sz="3200" b="0" i="1" smtClean="0">
+                                <a:latin typeface="Cambria Math"/>
+                              </a:rPr>
+                            </m:ctrlPr>
+                          </m:sSubPr>
+                          <m:e>
+                            <m:r>
+                              <a:rPr lang="de-DE" sz="3200" b="0" i="1" smtClean="0">
+                                <a:latin typeface="Cambria Math"/>
+                              </a:rPr>
+                              <m:t>𝑟</m:t>
+                            </m:r>
+                          </m:e>
+                          <m:sub>
+                            <m:r>
+                              <a:rPr lang="de-DE" sz="3200" b="0" i="1" smtClean="0">
+                                <a:latin typeface="Cambria Math"/>
+                              </a:rPr>
+                              <m:t>𝑖𝑗</m:t>
+                            </m:r>
+                          </m:sub>
+                        </m:sSub>
+                      </m:e>
+                    </m:func>
+                  </m:oMath>
+                </a14:m>
+                <a:r>
+                  <a:rPr lang="en-GB" sz="3200" dirty="0" smtClean="0"/>
+                  <a:t>(t) = </a:t>
+                </a:r>
+                <a14:m>
+                  <m:oMath xmlns:m="http://schemas.openxmlformats.org/officeDocument/2006/math">
+                    <m:f>
+                      <m:fPr>
+                        <m:ctrlPr>
+                          <a:rPr lang="en-GB" sz="3200" i="1" smtClean="0">
+                            <a:latin typeface="Cambria Math"/>
+                          </a:rPr>
+                        </m:ctrlPr>
+                      </m:fPr>
+                      <m:num>
+                        <m:r>
+                          <a:rPr lang="de-DE" sz="3200" b="0" i="1" smtClean="0">
+                            <a:latin typeface="Cambria Math"/>
+                          </a:rPr>
+                          <m:t>[</m:t>
+                        </m:r>
+                        <m:sSubSup>
+                          <m:sSubSupPr>
+                            <m:ctrlPr>
+                              <a:rPr lang="de-DE" sz="3200" b="0" i="1" smtClean="0">
+                                <a:latin typeface="Cambria Math"/>
+                              </a:rPr>
+                            </m:ctrlPr>
+                          </m:sSubSupPr>
+                          <m:e>
+                            <m:r>
+                              <a:rPr lang="el-GR" sz="3200" i="1" dirty="0">
+                                <a:latin typeface="Cambria Math"/>
+                                <a:ea typeface="Cambria Math"/>
+                              </a:rPr>
+                              <m:t>𝜃</m:t>
+                            </m:r>
+                          </m:e>
+                          <m:sub>
+                            <m:r>
+                              <a:rPr lang="de-DE" sz="3200" b="0" i="1" smtClean="0">
+                                <a:latin typeface="Cambria Math"/>
+                              </a:rPr>
+                              <m:t>𝑗</m:t>
+                            </m:r>
+                          </m:sub>
+                          <m:sup/>
+                        </m:sSubSup>
+                        <m:r>
+                          <a:rPr lang="de-DE" sz="3200" b="0" i="1" smtClean="0">
+                            <a:latin typeface="Cambria Math"/>
+                          </a:rPr>
+                          <m:t> </m:t>
+                        </m:r>
+                        <m:d>
+                          <m:dPr>
+                            <m:ctrlPr>
+                              <a:rPr lang="de-DE" sz="3200" b="0" i="1" baseline="14000" smtClean="0">
+                                <a:latin typeface="Cambria Math"/>
+                              </a:rPr>
+                            </m:ctrlPr>
+                          </m:dPr>
+                          <m:e>
+                            <m:r>
+                              <a:rPr lang="de-DE" sz="3200" b="0" i="1" baseline="14000" smtClean="0">
+                                <a:latin typeface="Cambria Math"/>
+                              </a:rPr>
+                              <m:t>𝑡</m:t>
+                            </m:r>
+                            <m:r>
+                              <a:rPr lang="de-DE" sz="3200" b="0" i="1" baseline="8000" smtClean="0">
+                                <a:latin typeface="Cambria Math"/>
+                              </a:rPr>
+                              <m:t>+</m:t>
+                            </m:r>
+                            <m:r>
+                              <a:rPr lang="de-DE" sz="3200" b="0" i="1" baseline="14000" smtClean="0">
+                                <a:latin typeface="Cambria Math"/>
+                              </a:rPr>
+                              <m:t>1</m:t>
+                            </m:r>
+                          </m:e>
+                        </m:d>
+                        <m:r>
+                          <a:rPr lang="de-DE" sz="3200" b="0" i="1" smtClean="0">
+                            <a:latin typeface="Cambria Math"/>
+                          </a:rPr>
+                          <m:t> </m:t>
+                        </m:r>
+                        <m:d>
+                          <m:dPr>
+                            <m:ctrlPr>
+                              <a:rPr lang="de-DE" sz="3200" b="0" i="1" smtClean="0">
+                                <a:latin typeface="Cambria Math"/>
+                              </a:rPr>
+                            </m:ctrlPr>
+                          </m:dPr>
+                          <m:e>
+                            <m:r>
+                              <a:rPr lang="de-DE" sz="3200" b="0" i="1" smtClean="0">
+                                <a:latin typeface="Cambria Math"/>
+                              </a:rPr>
+                              <m:t>𝑖</m:t>
+                            </m:r>
+                          </m:e>
+                        </m:d>
+                        <m:r>
+                          <a:rPr lang="de-DE" sz="3200" b="0" i="1" smtClean="0">
+                            <a:latin typeface="Cambria Math"/>
+                          </a:rPr>
+                          <m:t>−</m:t>
+                        </m:r>
+                        <m:sSub>
+                          <m:sSubPr>
+                            <m:ctrlPr>
+                              <a:rPr lang="de-DE" sz="3200" b="0" i="1" smtClean="0">
+                                <a:latin typeface="Cambria Math"/>
+                              </a:rPr>
+                            </m:ctrlPr>
+                          </m:sSubPr>
+                          <m:e>
+                            <m:r>
+                              <a:rPr lang="el-GR" sz="3200" i="1" dirty="0">
+                                <a:latin typeface="Cambria Math"/>
+                                <a:ea typeface="Cambria Math"/>
+                              </a:rPr>
+                              <m:t>𝜃</m:t>
+                            </m:r>
+                          </m:e>
+                          <m:sub>
+                            <m:r>
+                              <a:rPr lang="de-DE" sz="3200" b="0" i="1" smtClean="0">
+                                <a:latin typeface="Cambria Math"/>
+                              </a:rPr>
+                              <m:t>𝑗</m:t>
+                            </m:r>
+                          </m:sub>
+                        </m:sSub>
+                        <m:r>
+                          <a:rPr lang="de-DE" sz="3200" b="0" i="1" baseline="14000" smtClean="0">
+                            <a:latin typeface="Cambria Math"/>
+                          </a:rPr>
+                          <m:t>∗</m:t>
+                        </m:r>
+                        <m:r>
+                          <a:rPr lang="de-DE" sz="3200" b="0" i="1" smtClean="0">
+                            <a:latin typeface="Cambria Math"/>
+                          </a:rPr>
+                          <m:t>]</m:t>
+                        </m:r>
+                      </m:num>
+                      <m:den>
+                        <m:r>
+                          <a:rPr lang="de-DE" sz="3200" b="0" i="1" smtClean="0">
+                            <a:latin typeface="Cambria Math"/>
+                          </a:rPr>
+                          <m:t>[</m:t>
+                        </m:r>
+                        <m:sSub>
+                          <m:sSubPr>
+                            <m:ctrlPr>
+                              <a:rPr lang="de-DE" sz="3200" b="0" i="1" smtClean="0">
+                                <a:latin typeface="Cambria Math"/>
+                              </a:rPr>
+                            </m:ctrlPr>
+                          </m:sSubPr>
+                          <m:e>
+                            <m:r>
+                              <a:rPr lang="el-GR" sz="3200" i="1" dirty="0">
+                                <a:latin typeface="Cambria Math"/>
+                                <a:ea typeface="Cambria Math"/>
+                              </a:rPr>
+                              <m:t>𝜃</m:t>
+                            </m:r>
+                          </m:e>
+                          <m:sub>
+                            <m:r>
+                              <a:rPr lang="de-DE" sz="3200" b="0" i="1" smtClean="0">
+                                <a:latin typeface="Cambria Math"/>
+                              </a:rPr>
+                              <m:t>𝑖</m:t>
+                            </m:r>
+                          </m:sub>
+                        </m:sSub>
+                        <m:r>
+                          <a:rPr lang="de-DE" sz="3200" b="0" i="1" smtClean="0">
+                            <a:latin typeface="Cambria Math"/>
+                          </a:rPr>
+                          <m:t> </m:t>
+                        </m:r>
+                        <m:d>
+                          <m:dPr>
+                            <m:ctrlPr>
+                              <a:rPr lang="de-DE" sz="3200" b="0" i="1" baseline="14000" smtClean="0">
+                                <a:latin typeface="Cambria Math"/>
+                              </a:rPr>
+                            </m:ctrlPr>
+                          </m:dPr>
+                          <m:e>
+                            <m:r>
+                              <a:rPr lang="de-DE" sz="3200" b="0" i="1" baseline="14000" smtClean="0">
+                                <a:latin typeface="Cambria Math"/>
+                              </a:rPr>
+                              <m:t>𝑡</m:t>
+                            </m:r>
+                          </m:e>
+                        </m:d>
+                        <m:r>
+                          <a:rPr lang="de-DE" sz="3200" b="0" i="1" smtClean="0">
+                            <a:latin typeface="Cambria Math"/>
+                          </a:rPr>
+                          <m:t> − </m:t>
+                        </m:r>
+                        <m:sSub>
+                          <m:sSubPr>
+                            <m:ctrlPr>
+                              <a:rPr lang="de-DE" sz="3200" b="0" i="1" smtClean="0">
+                                <a:latin typeface="Cambria Math"/>
+                              </a:rPr>
+                            </m:ctrlPr>
+                          </m:sSubPr>
+                          <m:e>
+                            <m:r>
+                              <a:rPr lang="el-GR" sz="3200" i="1" dirty="0">
+                                <a:latin typeface="Cambria Math"/>
+                                <a:ea typeface="Cambria Math"/>
+                              </a:rPr>
+                              <m:t>𝜃</m:t>
+                            </m:r>
+                          </m:e>
+                          <m:sub>
+                            <m:r>
+                              <a:rPr lang="de-DE" sz="3200" b="0" i="1" smtClean="0">
+                                <a:latin typeface="Cambria Math"/>
+                              </a:rPr>
+                              <m:t>𝑖</m:t>
+                            </m:r>
+                          </m:sub>
+                        </m:sSub>
+                        <m:r>
+                          <a:rPr lang="de-DE" sz="3200" b="0" i="1" baseline="14000" smtClean="0">
+                            <a:latin typeface="Cambria Math"/>
+                          </a:rPr>
+                          <m:t>∗</m:t>
+                        </m:r>
+                        <m:r>
+                          <a:rPr lang="de-DE" sz="3200" b="0" i="1" smtClean="0">
+                            <a:latin typeface="Cambria Math"/>
+                          </a:rPr>
+                          <m:t>]</m:t>
+                        </m:r>
+                      </m:den>
+                    </m:f>
+                  </m:oMath>
+                </a14:m>
+                <a:r>
+                  <a:rPr lang="en-GB" sz="3200" dirty="0" smtClean="0"/>
+                  <a:t> for j = 1,…d</a:t>
+                </a:r>
+              </a:p>
+              <a:p>
+                <a:pPr marL="285750" indent="-285750">
+                  <a:spcAft>
+                    <a:spcPts val="1200"/>
+                  </a:spcAft>
+                  <a:buFont typeface="Arial" pitchFamily="34" charset="0"/>
+                  <a:buChar char="•"/>
+                </a:pPr>
+                <a:r>
+                  <a:rPr lang="en-GB" sz="3200" dirty="0" smtClean="0"/>
+                  <a:t>Step 3: Evaluation of </a:t>
+                </a:r>
+              </a:p>
+              <a:p>
+                <a:pPr algn="ctr">
+                  <a:spcAft>
+                    <a:spcPts val="1200"/>
+                  </a:spcAft>
+                </a:pPr>
+                <a14:m>
+                  <m:oMath xmlns:m="http://schemas.openxmlformats.org/officeDocument/2006/math">
+                    <m:r>
+                      <a:rPr lang="de-DE" sz="3200" b="0" i="1" smtClean="0">
+                        <a:latin typeface="Cambria Math"/>
+                      </a:rPr>
+                      <m:t>𝑉</m:t>
+                    </m:r>
+                    <m:r>
+                      <a:rPr lang="de-DE" sz="3200" b="0" i="1" smtClean="0">
+                        <a:latin typeface="Cambria Math"/>
+                      </a:rPr>
+                      <m:t>= </m:t>
+                    </m:r>
+                    <m:sSup>
+                      <m:sSupPr>
+                        <m:ctrlPr>
+                          <a:rPr lang="de-DE" sz="3200" b="0" i="1" smtClean="0">
+                            <a:latin typeface="Cambria Math"/>
+                          </a:rPr>
+                        </m:ctrlPr>
+                      </m:sSupPr>
+                      <m:e>
+                        <m:sSub>
+                          <m:sSubPr>
+                            <m:ctrlPr>
+                              <a:rPr lang="en-GB" sz="3200" i="1" dirty="0">
+                                <a:latin typeface="Cambria Math"/>
+                              </a:rPr>
+                            </m:ctrlPr>
+                          </m:sSubPr>
+                          <m:e>
+                            <m:r>
+                              <a:rPr lang="de-DE" sz="3200" i="1" dirty="0">
+                                <a:latin typeface="Cambria Math"/>
+                              </a:rPr>
+                              <m:t>𝐼</m:t>
+                            </m:r>
+                          </m:e>
+                          <m:sub>
+                            <m:r>
+                              <a:rPr lang="de-DE" sz="3200" i="1" dirty="0">
+                                <a:latin typeface="Cambria Math"/>
+                              </a:rPr>
+                              <m:t>𝑜𝑐</m:t>
+                            </m:r>
+                          </m:sub>
+                        </m:sSub>
+                      </m:e>
+                      <m:sup>
+                        <m:r>
+                          <a:rPr lang="de-DE" sz="3200" b="0" i="1" smtClean="0">
+                            <a:latin typeface="Cambria Math"/>
+                          </a:rPr>
+                          <m:t>−1</m:t>
+                        </m:r>
+                      </m:sup>
+                    </m:sSup>
+                  </m:oMath>
+                </a14:m>
+                <a:r>
+                  <a:rPr lang="en-GB" sz="3200" dirty="0" smtClean="0"/>
+                  <a:t> + </a:t>
+                </a:r>
+                <a14:m>
+                  <m:oMath xmlns:m="http://schemas.openxmlformats.org/officeDocument/2006/math">
+                    <m:r>
+                      <a:rPr lang="en-GB" sz="3200" i="1" smtClean="0">
+                        <a:latin typeface="Cambria Math"/>
+                        <a:ea typeface="Cambria Math"/>
+                      </a:rPr>
+                      <m:t>∆</m:t>
+                    </m:r>
+                    <m:r>
+                      <a:rPr lang="de-DE" sz="3200" b="0" i="1" smtClean="0">
+                        <a:latin typeface="Cambria Math"/>
+                        <a:ea typeface="Cambria Math"/>
+                      </a:rPr>
+                      <m:t>𝑉</m:t>
+                    </m:r>
+                    <m:r>
+                      <a:rPr lang="de-DE" sz="3200" b="0" i="1" smtClean="0">
+                        <a:latin typeface="Cambria Math"/>
+                        <a:ea typeface="Cambria Math"/>
+                      </a:rPr>
+                      <m:t>, </m:t>
+                    </m:r>
+                    <m:r>
+                      <a:rPr lang="de-DE" sz="3200" b="0" i="1" smtClean="0">
+                        <a:latin typeface="Cambria Math"/>
+                        <a:ea typeface="Cambria Math"/>
+                      </a:rPr>
+                      <m:t>𝑤h𝑒𝑟𝑒</m:t>
+                    </m:r>
+                    <m:r>
+                      <a:rPr lang="de-DE" sz="3200" b="0" i="1" smtClean="0">
+                        <a:latin typeface="Cambria Math"/>
+                        <a:ea typeface="Cambria Math"/>
+                      </a:rPr>
+                      <m:t> ∆</m:t>
+                    </m:r>
+                    <m:r>
+                      <a:rPr lang="de-DE" sz="3200" i="1">
+                        <a:latin typeface="Cambria Math"/>
+                        <a:ea typeface="Cambria Math"/>
+                      </a:rPr>
+                      <m:t>𝑉</m:t>
+                    </m:r>
+                  </m:oMath>
+                </a14:m>
+                <a:r>
+                  <a:rPr lang="en-GB" sz="3200" dirty="0" smtClean="0"/>
+                  <a:t> = = </a:t>
+                </a:r>
+                <a14:m>
+                  <m:oMath xmlns:m="http://schemas.openxmlformats.org/officeDocument/2006/math">
+                    <m:sSup>
+                      <m:sSupPr>
+                        <m:ctrlPr>
+                          <a:rPr lang="de-DE" sz="3200" i="1">
+                            <a:latin typeface="Cambria Math"/>
+                          </a:rPr>
+                        </m:ctrlPr>
+                      </m:sSupPr>
+                      <m:e>
+                        <m:sSub>
+                          <m:sSubPr>
+                            <m:ctrlPr>
+                              <a:rPr lang="en-GB" sz="3200" i="1" dirty="0">
+                                <a:latin typeface="Cambria Math"/>
+                              </a:rPr>
+                            </m:ctrlPr>
+                          </m:sSubPr>
+                          <m:e>
+                            <m:r>
+                              <a:rPr lang="de-DE" sz="3200" i="1" dirty="0">
+                                <a:latin typeface="Cambria Math"/>
+                              </a:rPr>
+                              <m:t>𝐼</m:t>
+                            </m:r>
+                          </m:e>
+                          <m:sub>
+                            <m:r>
+                              <a:rPr lang="de-DE" sz="3200" i="1" dirty="0">
+                                <a:latin typeface="Cambria Math"/>
+                              </a:rPr>
+                              <m:t>𝑜𝑐</m:t>
+                            </m:r>
+                          </m:sub>
+                        </m:sSub>
+                      </m:e>
+                      <m:sup>
+                        <m:r>
+                          <a:rPr lang="de-DE" sz="3200" i="1">
+                            <a:latin typeface="Cambria Math"/>
+                          </a:rPr>
+                          <m:t>−1</m:t>
+                        </m:r>
+                      </m:sup>
+                    </m:sSup>
+                  </m:oMath>
+                </a14:m>
+                <a:r>
+                  <a:rPr lang="en-GB" sz="3200" dirty="0" smtClean="0"/>
+                  <a:t>DM</a:t>
+                </a:r>
+                <a14:m>
+                  <m:oMath xmlns:m="http://schemas.openxmlformats.org/officeDocument/2006/math">
+                    <m:sSup>
+                      <m:sSupPr>
+                        <m:ctrlPr>
+                          <a:rPr lang="en-GB" sz="3200" i="1" smtClean="0">
+                            <a:latin typeface="Cambria Math"/>
+                          </a:rPr>
+                        </m:ctrlPr>
+                      </m:sSupPr>
+                      <m:e>
+                        <m:r>
+                          <m:rPr>
+                            <m:nor/>
+                          </m:rPr>
+                          <a:rPr lang="en-GB" sz="3200" dirty="0"/>
+                          <m:t>(</m:t>
+                        </m:r>
+                        <m:r>
+                          <m:rPr>
+                            <m:nor/>
+                          </m:rPr>
+                          <a:rPr lang="en-GB" sz="3200" dirty="0"/>
+                          <m:t>I</m:t>
+                        </m:r>
+                        <m:r>
+                          <m:rPr>
+                            <m:nor/>
+                          </m:rPr>
+                          <a:rPr lang="en-GB" sz="3200" dirty="0"/>
+                          <m:t> - </m:t>
+                        </m:r>
+                        <m:r>
+                          <m:rPr>
+                            <m:nor/>
+                          </m:rPr>
+                          <a:rPr lang="en-GB" sz="3200" dirty="0"/>
+                          <m:t>DM</m:t>
+                        </m:r>
+                        <m:r>
+                          <m:rPr>
+                            <m:nor/>
+                          </m:rPr>
+                          <a:rPr lang="en-GB" sz="3200" dirty="0"/>
+                          <m:t>)</m:t>
+                        </m:r>
+                      </m:e>
+                      <m:sup>
+                        <m:r>
+                          <a:rPr lang="de-DE" sz="3200" b="0" i="1" smtClean="0">
+                            <a:latin typeface="Cambria Math"/>
+                          </a:rPr>
+                          <m:t>−1</m:t>
+                        </m:r>
+                      </m:sup>
+                    </m:sSup>
+                  </m:oMath>
+                </a14:m>
+                <a:endParaRPr lang="en-GB" sz="3200" dirty="0" smtClean="0"/>
+              </a:p>
+              <a:p>
+                <a:pPr marL="285750" indent="-285750">
+                  <a:spcAft>
+                    <a:spcPts val="1200"/>
+                  </a:spcAft>
+                  <a:buFont typeface="Arial" pitchFamily="34" charset="0"/>
+                  <a:buChar char="•"/>
+                </a:pPr>
+                <a:endParaRPr lang="en-GB" sz="2800" dirty="0"/>
+              </a:p>
+            </p:txBody>
+          </p:sp>
+        </mc:Choice>
+        <mc:Fallback>
+          <p:sp>
+            <p:nvSpPr>
+              <p:cNvPr id="105" name="Textfeld 104"/>
+              <p:cNvSpPr txBox="1">
+                <a:spLocks noRot="1" noChangeAspect="1" noMove="1" noResize="1" noEditPoints="1" noAdjustHandles="1" noChangeArrowheads="1" noChangeShapeType="1" noTextEdit="1"/>
+              </p:cNvSpPr>
+              <p:nvPr/>
+            </p:nvSpPr>
+            <p:spPr>
+              <a:xfrm>
+                <a:off x="11596727" y="6697869"/>
+                <a:ext cx="9344942" cy="8181535"/>
+              </a:xfrm>
+              <a:prstGeom prst="rect">
+                <a:avLst/>
+              </a:prstGeom>
+              <a:blipFill rotWithShape="1">
+                <a:blip r:embed="rId5"/>
+                <a:stretch>
+                  <a:fillRect l="-1435" t="-969" r="-1631"/>
+                </a:stretch>
+              </a:blipFill>
+            </p:spPr>
+            <p:txBody>
+              <a:bodyPr/>
+              <a:lstStyle/>
+              <a:p>
+                <a:r>
+                  <a:rPr lang="de-DE">
+                    <a:noFill/>
+                  </a:rPr>
+                  <a:t> </a:t>
+                </a:r>
+              </a:p>
+            </p:txBody>
+          </p:sp>
+        </mc:Fallback>
+      </mc:AlternateContent>
+      <p:sp>
+        <p:nvSpPr>
+          <p:cNvPr id="106" name="Textfeld 105"/>
+          <p:cNvSpPr txBox="1"/>
+          <p:nvPr/>
+        </p:nvSpPr>
+        <p:spPr>
+          <a:xfrm>
+            <a:off x="32178498" y="6709187"/>
+            <a:ext cx="9344942" cy="1969770"/>
+          </a:xfrm>
+          <a:prstGeom prst="rect">
+            <a:avLst/>
+          </a:prstGeom>
+          <a:noFill/>
+        </p:spPr>
+        <p:txBody>
+          <a:bodyPr wrap="square" rtlCol="0">
+            <a:spAutoFit/>
+          </a:bodyPr>
+          <a:lstStyle/>
+          <a:p>
+            <a:pPr marL="285750" indent="-285750">
+              <a:spcAft>
+                <a:spcPts val="1200"/>
+              </a:spcAft>
+              <a:buFont typeface="Arial" pitchFamily="34" charset="0"/>
+              <a:buChar char="•"/>
+            </a:pPr>
+            <a:r>
+              <a:rPr lang="en-GB" sz="2800" dirty="0" smtClean="0"/>
+              <a:t>SEM is established in which open-source or commercial program?</a:t>
+            </a:r>
+          </a:p>
+          <a:p>
+            <a:pPr marL="285750" indent="-285750">
+              <a:spcAft>
+                <a:spcPts val="1200"/>
+              </a:spcAft>
+              <a:buFont typeface="Arial" pitchFamily="34" charset="0"/>
+              <a:buChar char="•"/>
+            </a:pPr>
+            <a:r>
+              <a:rPr lang="en-GB" sz="2800" dirty="0" smtClean="0"/>
+              <a:t>Since 1996, has SEM established or are there better methods?</a:t>
+            </a:r>
+            <a:endParaRPr lang="en-GB" sz="3200" dirty="0" smtClean="0"/>
+          </a:p>
+        </p:txBody>
+      </p:sp>
+      <p:sp>
+        <p:nvSpPr>
+          <p:cNvPr id="107" name="Textfeld 106"/>
+          <p:cNvSpPr txBox="1"/>
+          <p:nvPr/>
+        </p:nvSpPr>
+        <p:spPr>
+          <a:xfrm>
+            <a:off x="32178498" y="23375263"/>
+            <a:ext cx="9344942" cy="523220"/>
+          </a:xfrm>
+          <a:prstGeom prst="rect">
+            <a:avLst/>
+          </a:prstGeom>
+          <a:noFill/>
+        </p:spPr>
+        <p:txBody>
+          <a:bodyPr wrap="square" rtlCol="0">
+            <a:spAutoFit/>
+          </a:bodyPr>
+          <a:lstStyle/>
+          <a:p>
+            <a:pPr marL="285750" indent="-285750">
+              <a:spcAft>
+                <a:spcPts val="1200"/>
+              </a:spcAft>
+              <a:buFont typeface="Arial" pitchFamily="34" charset="0"/>
+              <a:buChar char="•"/>
+            </a:pPr>
+            <a:r>
+              <a:rPr lang="en-GB" sz="2800" dirty="0" err="1" smtClean="0"/>
+              <a:t>Meng</a:t>
+            </a:r>
+            <a:r>
+              <a:rPr lang="en-GB" sz="2800" dirty="0" smtClean="0"/>
+              <a:t> &amp; Rubin, 1996</a:t>
+            </a:r>
+            <a:endParaRPr lang="en-GB" sz="3200" dirty="0" smtClean="0"/>
           </a:p>
         </p:txBody>
       </p:sp>
@@ -4602,6 +6690,13 @@
   <p:clrMapOvr>
     <a:masterClrMapping/>
   </p:clrMapOvr>
+  <p:timing>
+    <p:tnLst>
+      <p:par>
+        <p:cTn id="1" dur="indefinite" restart="never" nodeType="tmRoot"/>
+      </p:par>
+    </p:tnLst>
+  </p:timing>
 </p:sld>
 </file>
 

</xml_diff>